<commit_message>
Update Awards Ceremony presentation file
Modified the "Awards Ceremony - Short.pptx" file. Specific changes are not detailed due to the binary nature of the file, but differences exist between the current and previous versions.
</commit_message>
<xml_diff>
--- a/Api/Templates/Awards Ceremony - Short.pptx
+++ b/Api/Templates/Awards Ceremony - Short.pptx
@@ -2,7 +2,7 @@
 <file path=ppt/presentation.xml><?xml version="1.0" encoding="utf-8"?>
 <p:presentation xmlns:a="http://schemas.openxmlformats.org/drawingml/2006/main" xmlns:r="http://schemas.openxmlformats.org/officeDocument/2006/relationships" xmlns:p="http://schemas.openxmlformats.org/presentationml/2006/main" strictFirstAndLastChars="0" embedTrueTypeFonts="1" saveSubsetFonts="1" autoCompressPictures="0">
   <p:sldMasterIdLst>
-    <p:sldMasterId id="2147483665" r:id="rId1"/>
+    <p:sldMasterId id="2147483670" r:id="rId1"/>
   </p:sldMasterIdLst>
   <p:notesMasterIdLst>
     <p:notesMasterId r:id="rId30"/>
@@ -56,231 +56,97 @@
     </p:embeddedFont>
   </p:embeddedFontLst>
   <p:defaultTextStyle>
-    <a:defPPr marR="0" lvl="0" algn="l" rtl="0">
-      <a:lnSpc>
-        <a:spcPct val="100000"/>
-      </a:lnSpc>
-      <a:spcBef>
-        <a:spcPts val="0"/>
-      </a:spcBef>
-      <a:spcAft>
-        <a:spcPts val="0"/>
-      </a:spcAft>
+    <a:defPPr>
+      <a:defRPr lang="en-US"/>
     </a:defPPr>
-    <a:lvl1pPr marR="0" lvl="0" algn="l" rtl="0">
-      <a:lnSpc>
-        <a:spcPct val="100000"/>
-      </a:lnSpc>
-      <a:spcBef>
-        <a:spcPts val="0"/>
-      </a:spcBef>
-      <a:spcAft>
-        <a:spcPts val="0"/>
-      </a:spcAft>
-      <a:buClr>
-        <a:srgbClr val="000000"/>
-      </a:buClr>
-      <a:buFont typeface="Arial"/>
-      <a:defRPr sz="1400" b="0" i="0" u="none" strike="noStrike" cap="none">
+    <a:lvl1pPr marL="0" algn="l" defTabSz="914400" rtl="0" eaLnBrk="1" latinLnBrk="0" hangingPunct="1">
+      <a:defRPr sz="1800" kern="1200">
         <a:solidFill>
-          <a:srgbClr val="000000"/>
+          <a:schemeClr val="tx1"/>
         </a:solidFill>
-        <a:latin typeface="Arial"/>
-        <a:ea typeface="Arial"/>
-        <a:cs typeface="Arial"/>
-        <a:sym typeface="Arial"/>
+        <a:latin typeface="+mn-lt"/>
+        <a:ea typeface="+mn-ea"/>
+        <a:cs typeface="+mn-cs"/>
       </a:defRPr>
     </a:lvl1pPr>
-    <a:lvl2pPr marR="0" lvl="1" algn="l" rtl="0">
-      <a:lnSpc>
-        <a:spcPct val="100000"/>
-      </a:lnSpc>
-      <a:spcBef>
-        <a:spcPts val="0"/>
-      </a:spcBef>
-      <a:spcAft>
-        <a:spcPts val="0"/>
-      </a:spcAft>
-      <a:buClr>
-        <a:srgbClr val="000000"/>
-      </a:buClr>
-      <a:buFont typeface="Arial"/>
-      <a:defRPr sz="1400" b="0" i="0" u="none" strike="noStrike" cap="none">
+    <a:lvl2pPr marL="457200" algn="l" defTabSz="914400" rtl="0" eaLnBrk="1" latinLnBrk="0" hangingPunct="1">
+      <a:defRPr sz="1800" kern="1200">
         <a:solidFill>
-          <a:srgbClr val="000000"/>
+          <a:schemeClr val="tx1"/>
         </a:solidFill>
-        <a:latin typeface="Arial"/>
-        <a:ea typeface="Arial"/>
-        <a:cs typeface="Arial"/>
-        <a:sym typeface="Arial"/>
+        <a:latin typeface="+mn-lt"/>
+        <a:ea typeface="+mn-ea"/>
+        <a:cs typeface="+mn-cs"/>
       </a:defRPr>
     </a:lvl2pPr>
-    <a:lvl3pPr marR="0" lvl="2" algn="l" rtl="0">
-      <a:lnSpc>
-        <a:spcPct val="100000"/>
-      </a:lnSpc>
-      <a:spcBef>
-        <a:spcPts val="0"/>
-      </a:spcBef>
-      <a:spcAft>
-        <a:spcPts val="0"/>
-      </a:spcAft>
-      <a:buClr>
-        <a:srgbClr val="000000"/>
-      </a:buClr>
-      <a:buFont typeface="Arial"/>
-      <a:defRPr sz="1400" b="0" i="0" u="none" strike="noStrike" cap="none">
+    <a:lvl3pPr marL="914400" algn="l" defTabSz="914400" rtl="0" eaLnBrk="1" latinLnBrk="0" hangingPunct="1">
+      <a:defRPr sz="1800" kern="1200">
         <a:solidFill>
-          <a:srgbClr val="000000"/>
+          <a:schemeClr val="tx1"/>
         </a:solidFill>
-        <a:latin typeface="Arial"/>
-        <a:ea typeface="Arial"/>
-        <a:cs typeface="Arial"/>
-        <a:sym typeface="Arial"/>
+        <a:latin typeface="+mn-lt"/>
+        <a:ea typeface="+mn-ea"/>
+        <a:cs typeface="+mn-cs"/>
       </a:defRPr>
     </a:lvl3pPr>
-    <a:lvl4pPr marR="0" lvl="3" algn="l" rtl="0">
-      <a:lnSpc>
-        <a:spcPct val="100000"/>
-      </a:lnSpc>
-      <a:spcBef>
-        <a:spcPts val="0"/>
-      </a:spcBef>
-      <a:spcAft>
-        <a:spcPts val="0"/>
-      </a:spcAft>
-      <a:buClr>
-        <a:srgbClr val="000000"/>
-      </a:buClr>
-      <a:buFont typeface="Arial"/>
-      <a:defRPr sz="1400" b="0" i="0" u="none" strike="noStrike" cap="none">
+    <a:lvl4pPr marL="1371600" algn="l" defTabSz="914400" rtl="0" eaLnBrk="1" latinLnBrk="0" hangingPunct="1">
+      <a:defRPr sz="1800" kern="1200">
         <a:solidFill>
-          <a:srgbClr val="000000"/>
+          <a:schemeClr val="tx1"/>
         </a:solidFill>
-        <a:latin typeface="Arial"/>
-        <a:ea typeface="Arial"/>
-        <a:cs typeface="Arial"/>
-        <a:sym typeface="Arial"/>
+        <a:latin typeface="+mn-lt"/>
+        <a:ea typeface="+mn-ea"/>
+        <a:cs typeface="+mn-cs"/>
       </a:defRPr>
     </a:lvl4pPr>
-    <a:lvl5pPr marR="0" lvl="4" algn="l" rtl="0">
-      <a:lnSpc>
-        <a:spcPct val="100000"/>
-      </a:lnSpc>
-      <a:spcBef>
-        <a:spcPts val="0"/>
-      </a:spcBef>
-      <a:spcAft>
-        <a:spcPts val="0"/>
-      </a:spcAft>
-      <a:buClr>
-        <a:srgbClr val="000000"/>
-      </a:buClr>
-      <a:buFont typeface="Arial"/>
-      <a:defRPr sz="1400" b="0" i="0" u="none" strike="noStrike" cap="none">
+    <a:lvl5pPr marL="1828800" algn="l" defTabSz="914400" rtl="0" eaLnBrk="1" latinLnBrk="0" hangingPunct="1">
+      <a:defRPr sz="1800" kern="1200">
         <a:solidFill>
-          <a:srgbClr val="000000"/>
+          <a:schemeClr val="tx1"/>
         </a:solidFill>
-        <a:latin typeface="Arial"/>
-        <a:ea typeface="Arial"/>
-        <a:cs typeface="Arial"/>
-        <a:sym typeface="Arial"/>
+        <a:latin typeface="+mn-lt"/>
+        <a:ea typeface="+mn-ea"/>
+        <a:cs typeface="+mn-cs"/>
       </a:defRPr>
     </a:lvl5pPr>
-    <a:lvl6pPr marR="0" lvl="5" algn="l" rtl="0">
-      <a:lnSpc>
-        <a:spcPct val="100000"/>
-      </a:lnSpc>
-      <a:spcBef>
-        <a:spcPts val="0"/>
-      </a:spcBef>
-      <a:spcAft>
-        <a:spcPts val="0"/>
-      </a:spcAft>
-      <a:buClr>
-        <a:srgbClr val="000000"/>
-      </a:buClr>
-      <a:buFont typeface="Arial"/>
-      <a:defRPr sz="1400" b="0" i="0" u="none" strike="noStrike" cap="none">
+    <a:lvl6pPr marL="2286000" algn="l" defTabSz="914400" rtl="0" eaLnBrk="1" latinLnBrk="0" hangingPunct="1">
+      <a:defRPr sz="1800" kern="1200">
         <a:solidFill>
-          <a:srgbClr val="000000"/>
+          <a:schemeClr val="tx1"/>
         </a:solidFill>
-        <a:latin typeface="Arial"/>
-        <a:ea typeface="Arial"/>
-        <a:cs typeface="Arial"/>
-        <a:sym typeface="Arial"/>
+        <a:latin typeface="+mn-lt"/>
+        <a:ea typeface="+mn-ea"/>
+        <a:cs typeface="+mn-cs"/>
       </a:defRPr>
     </a:lvl6pPr>
-    <a:lvl7pPr marR="0" lvl="6" algn="l" rtl="0">
-      <a:lnSpc>
-        <a:spcPct val="100000"/>
-      </a:lnSpc>
-      <a:spcBef>
-        <a:spcPts val="0"/>
-      </a:spcBef>
-      <a:spcAft>
-        <a:spcPts val="0"/>
-      </a:spcAft>
-      <a:buClr>
-        <a:srgbClr val="000000"/>
-      </a:buClr>
-      <a:buFont typeface="Arial"/>
-      <a:defRPr sz="1400" b="0" i="0" u="none" strike="noStrike" cap="none">
+    <a:lvl7pPr marL="2743200" algn="l" defTabSz="914400" rtl="0" eaLnBrk="1" latinLnBrk="0" hangingPunct="1">
+      <a:defRPr sz="1800" kern="1200">
         <a:solidFill>
-          <a:srgbClr val="000000"/>
+          <a:schemeClr val="tx1"/>
         </a:solidFill>
-        <a:latin typeface="Arial"/>
-        <a:ea typeface="Arial"/>
-        <a:cs typeface="Arial"/>
-        <a:sym typeface="Arial"/>
+        <a:latin typeface="+mn-lt"/>
+        <a:ea typeface="+mn-ea"/>
+        <a:cs typeface="+mn-cs"/>
       </a:defRPr>
     </a:lvl7pPr>
-    <a:lvl8pPr marR="0" lvl="7" algn="l" rtl="0">
-      <a:lnSpc>
-        <a:spcPct val="100000"/>
-      </a:lnSpc>
-      <a:spcBef>
-        <a:spcPts val="0"/>
-      </a:spcBef>
-      <a:spcAft>
-        <a:spcPts val="0"/>
-      </a:spcAft>
-      <a:buClr>
-        <a:srgbClr val="000000"/>
-      </a:buClr>
-      <a:buFont typeface="Arial"/>
-      <a:defRPr sz="1400" b="0" i="0" u="none" strike="noStrike" cap="none">
+    <a:lvl8pPr marL="3200400" algn="l" defTabSz="914400" rtl="0" eaLnBrk="1" latinLnBrk="0" hangingPunct="1">
+      <a:defRPr sz="1800" kern="1200">
         <a:solidFill>
-          <a:srgbClr val="000000"/>
+          <a:schemeClr val="tx1"/>
         </a:solidFill>
-        <a:latin typeface="Arial"/>
-        <a:ea typeface="Arial"/>
-        <a:cs typeface="Arial"/>
-        <a:sym typeface="Arial"/>
+        <a:latin typeface="+mn-lt"/>
+        <a:ea typeface="+mn-ea"/>
+        <a:cs typeface="+mn-cs"/>
       </a:defRPr>
     </a:lvl8pPr>
-    <a:lvl9pPr marR="0" lvl="8" algn="l" rtl="0">
-      <a:lnSpc>
-        <a:spcPct val="100000"/>
-      </a:lnSpc>
-      <a:spcBef>
-        <a:spcPts val="0"/>
-      </a:spcBef>
-      <a:spcAft>
-        <a:spcPts val="0"/>
-      </a:spcAft>
-      <a:buClr>
-        <a:srgbClr val="000000"/>
-      </a:buClr>
-      <a:buFont typeface="Arial"/>
-      <a:defRPr sz="1400" b="0" i="0" u="none" strike="noStrike" cap="none">
+    <a:lvl9pPr marL="3657600" algn="l" defTabSz="914400" rtl="0" eaLnBrk="1" latinLnBrk="0" hangingPunct="1">
+      <a:defRPr sz="1800" kern="1200">
         <a:solidFill>
-          <a:srgbClr val="000000"/>
+          <a:schemeClr val="tx1"/>
         </a:solidFill>
-        <a:latin typeface="Arial"/>
-        <a:ea typeface="Arial"/>
-        <a:cs typeface="Arial"/>
-        <a:sym typeface="Arial"/>
+        <a:latin typeface="+mn-lt"/>
+        <a:ea typeface="+mn-ea"/>
+        <a:cs typeface="+mn-cs"/>
       </a:defRPr>
     </a:lvl9pPr>
   </p:defaultTextStyle>
@@ -307,8 +173,8 @@
 <pc:chgInfo xmlns:a="http://schemas.openxmlformats.org/drawingml/2006/main" xmlns:r="http://schemas.openxmlformats.org/officeDocument/2006/relationships" xmlns:ac="http://schemas.microsoft.com/office/drawing/2013/main/command" xmlns:pc="http://schemas.microsoft.com/office/powerpoint/2013/main/command">
   <pc:docChgLst>
     <pc:chgData name="Brady Merkel" userId="077b44faa59125c6" providerId="LiveId" clId="{63497E25-CDA1-4359-BFE0-FE2836652BE1}"/>
-    <pc:docChg chg="delSld modSld">
-      <pc:chgData name="Brady Merkel" userId="077b44faa59125c6" providerId="LiveId" clId="{63497E25-CDA1-4359-BFE0-FE2836652BE1}" dt="2025-03-23T23:18:10.594" v="2" actId="47"/>
+    <pc:docChg chg="custSel delSld modSld modMainMaster">
+      <pc:chgData name="Brady Merkel" userId="077b44faa59125c6" providerId="LiveId" clId="{63497E25-CDA1-4359-BFE0-FE2836652BE1}" dt="2025-03-23T23:25:05.978" v="10" actId="27636"/>
       <pc:docMkLst>
         <pc:docMk/>
       </pc:docMkLst>
@@ -318,6 +184,351 @@
           <pc:docMk/>
           <pc:sldMk cId="0" sldId="256"/>
         </pc:sldMkLst>
+      </pc:sldChg>
+      <pc:sldChg chg="addSp delSp modSp mod chgLayout">
+        <pc:chgData name="Brady Merkel" userId="077b44faa59125c6" providerId="LiveId" clId="{63497E25-CDA1-4359-BFE0-FE2836652BE1}" dt="2025-03-23T23:25:05.978" v="10" actId="27636"/>
+        <pc:sldMkLst>
+          <pc:docMk/>
+          <pc:sldMk cId="0" sldId="259"/>
+        </pc:sldMkLst>
+        <pc:spChg chg="add del mod">
+          <ac:chgData name="Brady Merkel" userId="077b44faa59125c6" providerId="LiveId" clId="{63497E25-CDA1-4359-BFE0-FE2836652BE1}" dt="2025-03-23T23:25:05.970" v="9" actId="6264"/>
+          <ac:spMkLst>
+            <pc:docMk/>
+            <pc:sldMk cId="0" sldId="259"/>
+            <ac:spMk id="2" creationId="{A5292C61-5CC3-1B8B-E55F-D9B386EBB6C0}"/>
+          </ac:spMkLst>
+        </pc:spChg>
+        <pc:spChg chg="add mod ord">
+          <ac:chgData name="Brady Merkel" userId="077b44faa59125c6" providerId="LiveId" clId="{63497E25-CDA1-4359-BFE0-FE2836652BE1}" dt="2025-03-23T23:25:05.978" v="10" actId="27636"/>
+          <ac:spMkLst>
+            <pc:docMk/>
+            <pc:sldMk cId="0" sldId="259"/>
+            <ac:spMk id="3" creationId="{05878970-13F9-B011-35BE-440948AA9787}"/>
+          </ac:spMkLst>
+        </pc:spChg>
+        <pc:spChg chg="mod ord">
+          <ac:chgData name="Brady Merkel" userId="077b44faa59125c6" providerId="LiveId" clId="{63497E25-CDA1-4359-BFE0-FE2836652BE1}" dt="2025-03-23T23:25:05.970" v="9" actId="6264"/>
+          <ac:spMkLst>
+            <pc:docMk/>
+            <pc:sldMk cId="0" sldId="259"/>
+            <ac:spMk id="89" creationId="{00000000-0000-0000-0000-000000000000}"/>
+          </ac:spMkLst>
+        </pc:spChg>
+      </pc:sldChg>
+      <pc:sldChg chg="modSp">
+        <pc:chgData name="Brady Merkel" userId="077b44faa59125c6" providerId="LiveId" clId="{63497E25-CDA1-4359-BFE0-FE2836652BE1}" dt="2025-03-23T23:22:59.279" v="3"/>
+        <pc:sldMkLst>
+          <pc:docMk/>
+          <pc:sldMk cId="0" sldId="266"/>
+        </pc:sldMkLst>
+        <pc:spChg chg="mod">
+          <ac:chgData name="Brady Merkel" userId="077b44faa59125c6" providerId="LiveId" clId="{63497E25-CDA1-4359-BFE0-FE2836652BE1}" dt="2025-03-23T23:22:59.279" v="3"/>
+          <ac:spMkLst>
+            <pc:docMk/>
+            <pc:sldMk cId="0" sldId="266"/>
+            <ac:spMk id="127" creationId="{00000000-0000-0000-0000-000000000000}"/>
+          </ac:spMkLst>
+        </pc:spChg>
+        <pc:spChg chg="mod">
+          <ac:chgData name="Brady Merkel" userId="077b44faa59125c6" providerId="LiveId" clId="{63497E25-CDA1-4359-BFE0-FE2836652BE1}" dt="2025-03-23T23:22:59.279" v="3"/>
+          <ac:spMkLst>
+            <pc:docMk/>
+            <pc:sldMk cId="0" sldId="266"/>
+            <ac:spMk id="128" creationId="{00000000-0000-0000-0000-000000000000}"/>
+          </ac:spMkLst>
+        </pc:spChg>
+      </pc:sldChg>
+      <pc:sldChg chg="modSp">
+        <pc:chgData name="Brady Merkel" userId="077b44faa59125c6" providerId="LiveId" clId="{63497E25-CDA1-4359-BFE0-FE2836652BE1}" dt="2025-03-23T23:22:59.279" v="3"/>
+        <pc:sldMkLst>
+          <pc:docMk/>
+          <pc:sldMk cId="0" sldId="267"/>
+        </pc:sldMkLst>
+        <pc:spChg chg="mod">
+          <ac:chgData name="Brady Merkel" userId="077b44faa59125c6" providerId="LiveId" clId="{63497E25-CDA1-4359-BFE0-FE2836652BE1}" dt="2025-03-23T23:22:59.279" v="3"/>
+          <ac:spMkLst>
+            <pc:docMk/>
+            <pc:sldMk cId="0" sldId="267"/>
+            <ac:spMk id="133" creationId="{00000000-0000-0000-0000-000000000000}"/>
+          </ac:spMkLst>
+        </pc:spChg>
+        <pc:spChg chg="mod">
+          <ac:chgData name="Brady Merkel" userId="077b44faa59125c6" providerId="LiveId" clId="{63497E25-CDA1-4359-BFE0-FE2836652BE1}" dt="2025-03-23T23:22:59.279" v="3"/>
+          <ac:spMkLst>
+            <pc:docMk/>
+            <pc:sldMk cId="0" sldId="267"/>
+            <ac:spMk id="134" creationId="{00000000-0000-0000-0000-000000000000}"/>
+          </ac:spMkLst>
+        </pc:spChg>
+      </pc:sldChg>
+      <pc:sldChg chg="modSp">
+        <pc:chgData name="Brady Merkel" userId="077b44faa59125c6" providerId="LiveId" clId="{63497E25-CDA1-4359-BFE0-FE2836652BE1}" dt="2025-03-23T23:22:59.279" v="3"/>
+        <pc:sldMkLst>
+          <pc:docMk/>
+          <pc:sldMk cId="0" sldId="269"/>
+        </pc:sldMkLst>
+        <pc:spChg chg="mod">
+          <ac:chgData name="Brady Merkel" userId="077b44faa59125c6" providerId="LiveId" clId="{63497E25-CDA1-4359-BFE0-FE2836652BE1}" dt="2025-03-23T23:22:59.279" v="3"/>
+          <ac:spMkLst>
+            <pc:docMk/>
+            <pc:sldMk cId="0" sldId="269"/>
+            <ac:spMk id="144" creationId="{00000000-0000-0000-0000-000000000000}"/>
+          </ac:spMkLst>
+        </pc:spChg>
+        <pc:spChg chg="mod">
+          <ac:chgData name="Brady Merkel" userId="077b44faa59125c6" providerId="LiveId" clId="{63497E25-CDA1-4359-BFE0-FE2836652BE1}" dt="2025-03-23T23:22:59.279" v="3"/>
+          <ac:spMkLst>
+            <pc:docMk/>
+            <pc:sldMk cId="0" sldId="269"/>
+            <ac:spMk id="145" creationId="{00000000-0000-0000-0000-000000000000}"/>
+          </ac:spMkLst>
+        </pc:spChg>
+      </pc:sldChg>
+      <pc:sldChg chg="modSp">
+        <pc:chgData name="Brady Merkel" userId="077b44faa59125c6" providerId="LiveId" clId="{63497E25-CDA1-4359-BFE0-FE2836652BE1}" dt="2025-03-23T23:22:59.279" v="3"/>
+        <pc:sldMkLst>
+          <pc:docMk/>
+          <pc:sldMk cId="0" sldId="270"/>
+        </pc:sldMkLst>
+        <pc:spChg chg="mod">
+          <ac:chgData name="Brady Merkel" userId="077b44faa59125c6" providerId="LiveId" clId="{63497E25-CDA1-4359-BFE0-FE2836652BE1}" dt="2025-03-23T23:22:59.279" v="3"/>
+          <ac:spMkLst>
+            <pc:docMk/>
+            <pc:sldMk cId="0" sldId="270"/>
+            <ac:spMk id="150" creationId="{00000000-0000-0000-0000-000000000000}"/>
+          </ac:spMkLst>
+        </pc:spChg>
+        <pc:spChg chg="mod">
+          <ac:chgData name="Brady Merkel" userId="077b44faa59125c6" providerId="LiveId" clId="{63497E25-CDA1-4359-BFE0-FE2836652BE1}" dt="2025-03-23T23:22:59.279" v="3"/>
+          <ac:spMkLst>
+            <pc:docMk/>
+            <pc:sldMk cId="0" sldId="270"/>
+            <ac:spMk id="151" creationId="{00000000-0000-0000-0000-000000000000}"/>
+          </ac:spMkLst>
+        </pc:spChg>
+      </pc:sldChg>
+      <pc:sldChg chg="modSp">
+        <pc:chgData name="Brady Merkel" userId="077b44faa59125c6" providerId="LiveId" clId="{63497E25-CDA1-4359-BFE0-FE2836652BE1}" dt="2025-03-23T23:22:59.279" v="3"/>
+        <pc:sldMkLst>
+          <pc:docMk/>
+          <pc:sldMk cId="0" sldId="272"/>
+        </pc:sldMkLst>
+        <pc:spChg chg="mod">
+          <ac:chgData name="Brady Merkel" userId="077b44faa59125c6" providerId="LiveId" clId="{63497E25-CDA1-4359-BFE0-FE2836652BE1}" dt="2025-03-23T23:22:59.279" v="3"/>
+          <ac:spMkLst>
+            <pc:docMk/>
+            <pc:sldMk cId="0" sldId="272"/>
+            <ac:spMk id="161" creationId="{00000000-0000-0000-0000-000000000000}"/>
+          </ac:spMkLst>
+        </pc:spChg>
+        <pc:spChg chg="mod">
+          <ac:chgData name="Brady Merkel" userId="077b44faa59125c6" providerId="LiveId" clId="{63497E25-CDA1-4359-BFE0-FE2836652BE1}" dt="2025-03-23T23:22:59.279" v="3"/>
+          <ac:spMkLst>
+            <pc:docMk/>
+            <pc:sldMk cId="0" sldId="272"/>
+            <ac:spMk id="162" creationId="{00000000-0000-0000-0000-000000000000}"/>
+          </ac:spMkLst>
+        </pc:spChg>
+      </pc:sldChg>
+      <pc:sldChg chg="modSp">
+        <pc:chgData name="Brady Merkel" userId="077b44faa59125c6" providerId="LiveId" clId="{63497E25-CDA1-4359-BFE0-FE2836652BE1}" dt="2025-03-23T23:22:59.279" v="3"/>
+        <pc:sldMkLst>
+          <pc:docMk/>
+          <pc:sldMk cId="0" sldId="273"/>
+        </pc:sldMkLst>
+        <pc:spChg chg="mod">
+          <ac:chgData name="Brady Merkel" userId="077b44faa59125c6" providerId="LiveId" clId="{63497E25-CDA1-4359-BFE0-FE2836652BE1}" dt="2025-03-23T23:22:59.279" v="3"/>
+          <ac:spMkLst>
+            <pc:docMk/>
+            <pc:sldMk cId="0" sldId="273"/>
+            <ac:spMk id="167" creationId="{00000000-0000-0000-0000-000000000000}"/>
+          </ac:spMkLst>
+        </pc:spChg>
+        <pc:spChg chg="mod">
+          <ac:chgData name="Brady Merkel" userId="077b44faa59125c6" providerId="LiveId" clId="{63497E25-CDA1-4359-BFE0-FE2836652BE1}" dt="2025-03-23T23:22:59.279" v="3"/>
+          <ac:spMkLst>
+            <pc:docMk/>
+            <pc:sldMk cId="0" sldId="273"/>
+            <ac:spMk id="168" creationId="{00000000-0000-0000-0000-000000000000}"/>
+          </ac:spMkLst>
+        </pc:spChg>
+      </pc:sldChg>
+      <pc:sldChg chg="modSp">
+        <pc:chgData name="Brady Merkel" userId="077b44faa59125c6" providerId="LiveId" clId="{63497E25-CDA1-4359-BFE0-FE2836652BE1}" dt="2025-03-23T23:22:59.279" v="3"/>
+        <pc:sldMkLst>
+          <pc:docMk/>
+          <pc:sldMk cId="0" sldId="275"/>
+        </pc:sldMkLst>
+        <pc:spChg chg="mod">
+          <ac:chgData name="Brady Merkel" userId="077b44faa59125c6" providerId="LiveId" clId="{63497E25-CDA1-4359-BFE0-FE2836652BE1}" dt="2025-03-23T23:22:59.279" v="3"/>
+          <ac:spMkLst>
+            <pc:docMk/>
+            <pc:sldMk cId="0" sldId="275"/>
+            <ac:spMk id="178" creationId="{00000000-0000-0000-0000-000000000000}"/>
+          </ac:spMkLst>
+        </pc:spChg>
+        <pc:spChg chg="mod">
+          <ac:chgData name="Brady Merkel" userId="077b44faa59125c6" providerId="LiveId" clId="{63497E25-CDA1-4359-BFE0-FE2836652BE1}" dt="2025-03-23T23:22:59.279" v="3"/>
+          <ac:spMkLst>
+            <pc:docMk/>
+            <pc:sldMk cId="0" sldId="275"/>
+            <ac:spMk id="179" creationId="{00000000-0000-0000-0000-000000000000}"/>
+          </ac:spMkLst>
+        </pc:spChg>
+      </pc:sldChg>
+      <pc:sldChg chg="modSp">
+        <pc:chgData name="Brady Merkel" userId="077b44faa59125c6" providerId="LiveId" clId="{63497E25-CDA1-4359-BFE0-FE2836652BE1}" dt="2025-03-23T23:22:59.279" v="3"/>
+        <pc:sldMkLst>
+          <pc:docMk/>
+          <pc:sldMk cId="0" sldId="276"/>
+        </pc:sldMkLst>
+        <pc:spChg chg="mod">
+          <ac:chgData name="Brady Merkel" userId="077b44faa59125c6" providerId="LiveId" clId="{63497E25-CDA1-4359-BFE0-FE2836652BE1}" dt="2025-03-23T23:22:59.279" v="3"/>
+          <ac:spMkLst>
+            <pc:docMk/>
+            <pc:sldMk cId="0" sldId="276"/>
+            <ac:spMk id="184" creationId="{00000000-0000-0000-0000-000000000000}"/>
+          </ac:spMkLst>
+        </pc:spChg>
+        <pc:spChg chg="mod">
+          <ac:chgData name="Brady Merkel" userId="077b44faa59125c6" providerId="LiveId" clId="{63497E25-CDA1-4359-BFE0-FE2836652BE1}" dt="2025-03-23T23:22:59.279" v="3"/>
+          <ac:spMkLst>
+            <pc:docMk/>
+            <pc:sldMk cId="0" sldId="276"/>
+            <ac:spMk id="185" creationId="{00000000-0000-0000-0000-000000000000}"/>
+          </ac:spMkLst>
+        </pc:spChg>
+      </pc:sldChg>
+      <pc:sldChg chg="modSp">
+        <pc:chgData name="Brady Merkel" userId="077b44faa59125c6" providerId="LiveId" clId="{63497E25-CDA1-4359-BFE0-FE2836652BE1}" dt="2025-03-23T23:22:59.279" v="3"/>
+        <pc:sldMkLst>
+          <pc:docMk/>
+          <pc:sldMk cId="0" sldId="278"/>
+        </pc:sldMkLst>
+        <pc:spChg chg="mod">
+          <ac:chgData name="Brady Merkel" userId="077b44faa59125c6" providerId="LiveId" clId="{63497E25-CDA1-4359-BFE0-FE2836652BE1}" dt="2025-03-23T23:22:59.279" v="3"/>
+          <ac:spMkLst>
+            <pc:docMk/>
+            <pc:sldMk cId="0" sldId="278"/>
+            <ac:spMk id="195" creationId="{00000000-0000-0000-0000-000000000000}"/>
+          </ac:spMkLst>
+        </pc:spChg>
+        <pc:spChg chg="mod">
+          <ac:chgData name="Brady Merkel" userId="077b44faa59125c6" providerId="LiveId" clId="{63497E25-CDA1-4359-BFE0-FE2836652BE1}" dt="2025-03-23T23:22:59.279" v="3"/>
+          <ac:spMkLst>
+            <pc:docMk/>
+            <pc:sldMk cId="0" sldId="278"/>
+            <ac:spMk id="196" creationId="{00000000-0000-0000-0000-000000000000}"/>
+          </ac:spMkLst>
+        </pc:spChg>
+      </pc:sldChg>
+      <pc:sldChg chg="modSp">
+        <pc:chgData name="Brady Merkel" userId="077b44faa59125c6" providerId="LiveId" clId="{63497E25-CDA1-4359-BFE0-FE2836652BE1}" dt="2025-03-23T23:22:59.279" v="3"/>
+        <pc:sldMkLst>
+          <pc:docMk/>
+          <pc:sldMk cId="0" sldId="279"/>
+        </pc:sldMkLst>
+        <pc:spChg chg="mod">
+          <ac:chgData name="Brady Merkel" userId="077b44faa59125c6" providerId="LiveId" clId="{63497E25-CDA1-4359-BFE0-FE2836652BE1}" dt="2025-03-23T23:22:59.279" v="3"/>
+          <ac:spMkLst>
+            <pc:docMk/>
+            <pc:sldMk cId="0" sldId="279"/>
+            <ac:spMk id="201" creationId="{00000000-0000-0000-0000-000000000000}"/>
+          </ac:spMkLst>
+        </pc:spChg>
+        <pc:spChg chg="mod">
+          <ac:chgData name="Brady Merkel" userId="077b44faa59125c6" providerId="LiveId" clId="{63497E25-CDA1-4359-BFE0-FE2836652BE1}" dt="2025-03-23T23:22:59.279" v="3"/>
+          <ac:spMkLst>
+            <pc:docMk/>
+            <pc:sldMk cId="0" sldId="279"/>
+            <ac:spMk id="202" creationId="{00000000-0000-0000-0000-000000000000}"/>
+          </ac:spMkLst>
+        </pc:spChg>
+      </pc:sldChg>
+      <pc:sldChg chg="modSp">
+        <pc:chgData name="Brady Merkel" userId="077b44faa59125c6" providerId="LiveId" clId="{63497E25-CDA1-4359-BFE0-FE2836652BE1}" dt="2025-03-23T23:22:59.279" v="3"/>
+        <pc:sldMkLst>
+          <pc:docMk/>
+          <pc:sldMk cId="0" sldId="293"/>
+        </pc:sldMkLst>
+        <pc:spChg chg="mod">
+          <ac:chgData name="Brady Merkel" userId="077b44faa59125c6" providerId="LiveId" clId="{63497E25-CDA1-4359-BFE0-FE2836652BE1}" dt="2025-03-23T23:22:59.279" v="3"/>
+          <ac:spMkLst>
+            <pc:docMk/>
+            <pc:sldMk cId="0" sldId="293"/>
+            <ac:spMk id="280" creationId="{00000000-0000-0000-0000-000000000000}"/>
+          </ac:spMkLst>
+        </pc:spChg>
+        <pc:spChg chg="mod">
+          <ac:chgData name="Brady Merkel" userId="077b44faa59125c6" providerId="LiveId" clId="{63497E25-CDA1-4359-BFE0-FE2836652BE1}" dt="2025-03-23T23:22:59.279" v="3"/>
+          <ac:spMkLst>
+            <pc:docMk/>
+            <pc:sldMk cId="0" sldId="293"/>
+            <ac:spMk id="281" creationId="{00000000-0000-0000-0000-000000000000}"/>
+          </ac:spMkLst>
+        </pc:spChg>
+      </pc:sldChg>
+      <pc:sldChg chg="modSp">
+        <pc:chgData name="Brady Merkel" userId="077b44faa59125c6" providerId="LiveId" clId="{63497E25-CDA1-4359-BFE0-FE2836652BE1}" dt="2025-03-23T23:22:59.279" v="3"/>
+        <pc:sldMkLst>
+          <pc:docMk/>
+          <pc:sldMk cId="0" sldId="294"/>
+        </pc:sldMkLst>
+        <pc:spChg chg="mod">
+          <ac:chgData name="Brady Merkel" userId="077b44faa59125c6" providerId="LiveId" clId="{63497E25-CDA1-4359-BFE0-FE2836652BE1}" dt="2025-03-23T23:22:59.279" v="3"/>
+          <ac:spMkLst>
+            <pc:docMk/>
+            <pc:sldMk cId="0" sldId="294"/>
+            <ac:spMk id="286" creationId="{00000000-0000-0000-0000-000000000000}"/>
+          </ac:spMkLst>
+        </pc:spChg>
+        <pc:spChg chg="mod">
+          <ac:chgData name="Brady Merkel" userId="077b44faa59125c6" providerId="LiveId" clId="{63497E25-CDA1-4359-BFE0-FE2836652BE1}" dt="2025-03-23T23:22:59.279" v="3"/>
+          <ac:spMkLst>
+            <pc:docMk/>
+            <pc:sldMk cId="0" sldId="294"/>
+            <ac:spMk id="287" creationId="{00000000-0000-0000-0000-000000000000}"/>
+          </ac:spMkLst>
+        </pc:spChg>
+      </pc:sldChg>
+      <pc:sldChg chg="modSp">
+        <pc:chgData name="Brady Merkel" userId="077b44faa59125c6" providerId="LiveId" clId="{63497E25-CDA1-4359-BFE0-FE2836652BE1}" dt="2025-03-23T23:22:59.279" v="3"/>
+        <pc:sldMkLst>
+          <pc:docMk/>
+          <pc:sldMk cId="0" sldId="298"/>
+        </pc:sldMkLst>
+        <pc:spChg chg="mod">
+          <ac:chgData name="Brady Merkel" userId="077b44faa59125c6" providerId="LiveId" clId="{63497E25-CDA1-4359-BFE0-FE2836652BE1}" dt="2025-03-23T23:22:59.279" v="3"/>
+          <ac:spMkLst>
+            <pc:docMk/>
+            <pc:sldMk cId="0" sldId="298"/>
+            <ac:spMk id="99" creationId="{00000000-0000-0000-0000-000000000000}"/>
+          </ac:spMkLst>
+        </pc:spChg>
+        <pc:spChg chg="mod">
+          <ac:chgData name="Brady Merkel" userId="077b44faa59125c6" providerId="LiveId" clId="{63497E25-CDA1-4359-BFE0-FE2836652BE1}" dt="2025-03-23T23:22:59.279" v="3"/>
+          <ac:spMkLst>
+            <pc:docMk/>
+            <pc:sldMk cId="0" sldId="298"/>
+            <ac:spMk id="100" creationId="{00000000-0000-0000-0000-000000000000}"/>
+          </ac:spMkLst>
+        </pc:spChg>
+      </pc:sldChg>
+      <pc:sldChg chg="modSp">
+        <pc:chgData name="Brady Merkel" userId="077b44faa59125c6" providerId="LiveId" clId="{63497E25-CDA1-4359-BFE0-FE2836652BE1}" dt="2025-03-23T23:22:59.279" v="3"/>
+        <pc:sldMkLst>
+          <pc:docMk/>
+          <pc:sldMk cId="854740014" sldId="300"/>
+        </pc:sldMkLst>
+        <pc:spChg chg="mod">
+          <ac:chgData name="Brady Merkel" userId="077b44faa59125c6" providerId="LiveId" clId="{63497E25-CDA1-4359-BFE0-FE2836652BE1}" dt="2025-03-23T23:22:59.279" v="3"/>
+          <ac:spMkLst>
+            <pc:docMk/>
+            <pc:sldMk cId="854740014" sldId="300"/>
+            <ac:spMk id="2" creationId="{4122A3F8-EFB9-FC12-0E0B-DB541BE52A16}"/>
+          </ac:spMkLst>
+        </pc:spChg>
       </pc:sldChg>
       <pc:sldChg chg="modSp mod">
         <pc:chgData name="Brady Merkel" userId="077b44faa59125c6" providerId="LiveId" clId="{63497E25-CDA1-4359-BFE0-FE2836652BE1}" dt="2025-03-23T23:17:38.220" v="1" actId="20577"/>
@@ -334,6 +545,67 @@
           </ac:spMkLst>
         </pc:spChg>
       </pc:sldChg>
+      <pc:sldChg chg="modSp">
+        <pc:chgData name="Brady Merkel" userId="077b44faa59125c6" providerId="LiveId" clId="{63497E25-CDA1-4359-BFE0-FE2836652BE1}" dt="2025-03-23T23:22:59.279" v="3"/>
+        <pc:sldMkLst>
+          <pc:docMk/>
+          <pc:sldMk cId="0" sldId="303"/>
+        </pc:sldMkLst>
+        <pc:spChg chg="mod">
+          <ac:chgData name="Brady Merkel" userId="077b44faa59125c6" providerId="LiveId" clId="{63497E25-CDA1-4359-BFE0-FE2836652BE1}" dt="2025-03-23T23:22:59.279" v="3"/>
+          <ac:spMkLst>
+            <pc:docMk/>
+            <pc:sldMk cId="0" sldId="303"/>
+            <ac:spMk id="225" creationId="{00000000-0000-0000-0000-000000000000}"/>
+          </ac:spMkLst>
+        </pc:spChg>
+        <pc:spChg chg="mod">
+          <ac:chgData name="Brady Merkel" userId="077b44faa59125c6" providerId="LiveId" clId="{63497E25-CDA1-4359-BFE0-FE2836652BE1}" dt="2025-03-23T23:22:59.279" v="3"/>
+          <ac:spMkLst>
+            <pc:docMk/>
+            <pc:sldMk cId="0" sldId="303"/>
+            <ac:spMk id="226" creationId="{00000000-0000-0000-0000-000000000000}"/>
+          </ac:spMkLst>
+        </pc:spChg>
+      </pc:sldChg>
+      <pc:sldChg chg="modSp">
+        <pc:chgData name="Brady Merkel" userId="077b44faa59125c6" providerId="LiveId" clId="{63497E25-CDA1-4359-BFE0-FE2836652BE1}" dt="2025-03-23T23:22:59.279" v="3"/>
+        <pc:sldMkLst>
+          <pc:docMk/>
+          <pc:sldMk cId="0" sldId="304"/>
+        </pc:sldMkLst>
+        <pc:spChg chg="mod">
+          <ac:chgData name="Brady Merkel" userId="077b44faa59125c6" providerId="LiveId" clId="{63497E25-CDA1-4359-BFE0-FE2836652BE1}" dt="2025-03-23T23:22:59.279" v="3"/>
+          <ac:spMkLst>
+            <pc:docMk/>
+            <pc:sldMk cId="0" sldId="304"/>
+            <ac:spMk id="232" creationId="{00000000-0000-0000-0000-000000000000}"/>
+          </ac:spMkLst>
+        </pc:spChg>
+      </pc:sldChg>
+      <pc:sldChg chg="modSp">
+        <pc:chgData name="Brady Merkel" userId="077b44faa59125c6" providerId="LiveId" clId="{63497E25-CDA1-4359-BFE0-FE2836652BE1}" dt="2025-03-23T23:22:59.279" v="3"/>
+        <pc:sldMkLst>
+          <pc:docMk/>
+          <pc:sldMk cId="0" sldId="305"/>
+        </pc:sldMkLst>
+        <pc:spChg chg="mod">
+          <ac:chgData name="Brady Merkel" userId="077b44faa59125c6" providerId="LiveId" clId="{63497E25-CDA1-4359-BFE0-FE2836652BE1}" dt="2025-03-23T23:22:59.279" v="3"/>
+          <ac:spMkLst>
+            <pc:docMk/>
+            <pc:sldMk cId="0" sldId="305"/>
+            <ac:spMk id="248" creationId="{00000000-0000-0000-0000-000000000000}"/>
+          </ac:spMkLst>
+        </pc:spChg>
+        <pc:spChg chg="mod">
+          <ac:chgData name="Brady Merkel" userId="077b44faa59125c6" providerId="LiveId" clId="{63497E25-CDA1-4359-BFE0-FE2836652BE1}" dt="2025-03-23T23:22:59.279" v="3"/>
+          <ac:spMkLst>
+            <pc:docMk/>
+            <pc:sldMk cId="0" sldId="305"/>
+            <ac:spMk id="249" creationId="{00000000-0000-0000-0000-000000000000}"/>
+          </ac:spMkLst>
+        </pc:spChg>
+      </pc:sldChg>
       <pc:sldMasterChg chg="delSldLayout">
         <pc:chgData name="Brady Merkel" userId="077b44faa59125c6" providerId="LiveId" clId="{63497E25-CDA1-4359-BFE0-FE2836652BE1}" dt="2025-03-23T23:18:10.594" v="2" actId="47"/>
         <pc:sldMasterMkLst>
@@ -346,6 +618,64 @@
             <pc:docMk/>
             <pc:sldMasterMk cId="0" sldId="2147483665"/>
             <pc:sldLayoutMk cId="3636124283" sldId="2147483666"/>
+          </pc:sldLayoutMkLst>
+        </pc:sldLayoutChg>
+      </pc:sldMasterChg>
+      <pc:sldMasterChg chg="modSldLayout">
+        <pc:chgData name="Brady Merkel" userId="077b44faa59125c6" providerId="LiveId" clId="{63497E25-CDA1-4359-BFE0-FE2836652BE1}" dt="2025-03-23T23:24:45.851" v="8" actId="207"/>
+        <pc:sldMasterMkLst>
+          <pc:docMk/>
+          <pc:sldMasterMk cId="3257810563" sldId="2147483670"/>
+        </pc:sldMasterMkLst>
+        <pc:sldLayoutChg chg="setBg">
+          <pc:chgData name="Brady Merkel" userId="077b44faa59125c6" providerId="LiveId" clId="{63497E25-CDA1-4359-BFE0-FE2836652BE1}" dt="2025-03-23T23:24:13.800" v="5"/>
+          <pc:sldLayoutMkLst>
+            <pc:docMk/>
+            <pc:sldMasterMk cId="3257810563" sldId="2147483670"/>
+            <pc:sldLayoutMk cId="3963360887" sldId="2147483682"/>
+          </pc:sldLayoutMkLst>
+        </pc:sldLayoutChg>
+        <pc:sldLayoutChg chg="modSp setBg">
+          <pc:chgData name="Brady Merkel" userId="077b44faa59125c6" providerId="LiveId" clId="{63497E25-CDA1-4359-BFE0-FE2836652BE1}" dt="2025-03-23T23:24:45.851" v="8" actId="207"/>
+          <pc:sldLayoutMkLst>
+            <pc:docMk/>
+            <pc:sldMasterMk cId="3257810563" sldId="2147483670"/>
+            <pc:sldLayoutMk cId="1139353765" sldId="2147483683"/>
+          </pc:sldLayoutMkLst>
+          <pc:spChg chg="mod">
+            <ac:chgData name="Brady Merkel" userId="077b44faa59125c6" providerId="LiveId" clId="{63497E25-CDA1-4359-BFE0-FE2836652BE1}" dt="2025-03-23T23:24:45.851" v="8" actId="207"/>
+            <ac:spMkLst>
+              <pc:docMk/>
+              <pc:sldMasterMk cId="3257810563" sldId="2147483670"/>
+              <pc:sldLayoutMk cId="1139353765" sldId="2147483683"/>
+              <ac:spMk id="61" creationId="{00000000-0000-0000-0000-000000000000}"/>
+            </ac:spMkLst>
+          </pc:spChg>
+          <pc:spChg chg="mod">
+            <ac:chgData name="Brady Merkel" userId="077b44faa59125c6" providerId="LiveId" clId="{63497E25-CDA1-4359-BFE0-FE2836652BE1}" dt="2025-03-23T23:24:45.851" v="8" actId="207"/>
+            <ac:spMkLst>
+              <pc:docMk/>
+              <pc:sldMasterMk cId="3257810563" sldId="2147483670"/>
+              <pc:sldLayoutMk cId="1139353765" sldId="2147483683"/>
+              <ac:spMk id="62" creationId="{00000000-0000-0000-0000-000000000000}"/>
+            </ac:spMkLst>
+          </pc:spChg>
+          <pc:spChg chg="mod">
+            <ac:chgData name="Brady Merkel" userId="077b44faa59125c6" providerId="LiveId" clId="{63497E25-CDA1-4359-BFE0-FE2836652BE1}" dt="2025-03-23T23:24:45.851" v="8" actId="207"/>
+            <ac:spMkLst>
+              <pc:docMk/>
+              <pc:sldMasterMk cId="3257810563" sldId="2147483670"/>
+              <pc:sldLayoutMk cId="1139353765" sldId="2147483683"/>
+              <ac:spMk id="63" creationId="{00000000-0000-0000-0000-000000000000}"/>
+            </ac:spMkLst>
+          </pc:spChg>
+        </pc:sldLayoutChg>
+        <pc:sldLayoutChg chg="setBg">
+          <pc:chgData name="Brady Merkel" userId="077b44faa59125c6" providerId="LiveId" clId="{63497E25-CDA1-4359-BFE0-FE2836652BE1}" dt="2025-03-23T23:24:25.124" v="7"/>
+          <pc:sldLayoutMkLst>
+            <pc:docMk/>
+            <pc:sldMasterMk cId="3257810563" sldId="2147483670"/>
+            <pc:sldLayoutMk cId="425107887" sldId="2147483684"/>
           </pc:sldLayoutMkLst>
         </pc:sldLayoutChg>
       </pc:sldMasterChg>
@@ -4002,465 +4332,8 @@
 </file>
 
 <file path=ppt/slideLayouts/slideLayout1.xml><?xml version="1.0" encoding="utf-8"?>
-<p:sldLayout xmlns:a="http://schemas.openxmlformats.org/drawingml/2006/main" xmlns:r="http://schemas.openxmlformats.org/officeDocument/2006/relationships" xmlns:p="http://schemas.openxmlformats.org/presentationml/2006/main" matchingName="1_Custom Layout">
-  <p:cSld name="1_Custom Layout">
-    <p:bg>
-      <p:bgPr>
-        <a:blipFill>
-          <a:blip r:embed="rId2" cstate="print">
-            <a:alphaModFix/>
-            <a:extLst>
-              <a:ext uri="{28A0092B-C50C-407E-A947-70E740481C1C}">
-                <a14:useLocalDpi xmlns:a14="http://schemas.microsoft.com/office/drawing/2010/main"/>
-              </a:ext>
-            </a:extLst>
-          </a:blip>
-          <a:stretch>
-            <a:fillRect/>
-          </a:stretch>
-        </a:blipFill>
-        <a:effectLst/>
-      </p:bgPr>
-    </p:bg>
-    <p:spTree>
-      <p:nvGrpSpPr>
-        <p:cNvPr id="1" name="Shape 68"/>
-        <p:cNvGrpSpPr/>
-        <p:nvPr/>
-      </p:nvGrpSpPr>
-      <p:grpSpPr>
-        <a:xfrm>
-          <a:off x="0" y="0"/>
-          <a:ext cx="0" cy="0"/>
-          <a:chOff x="0" y="0"/>
-          <a:chExt cx="0" cy="0"/>
-        </a:xfrm>
-      </p:grpSpPr>
-      <p:sp>
-        <p:nvSpPr>
-          <p:cNvPr id="69" name="Google Shape;69;p18"/>
-          <p:cNvSpPr txBox="1">
-            <a:spLocks noGrp="1"/>
-          </p:cNvSpPr>
-          <p:nvPr>
-            <p:ph type="title"/>
-          </p:nvPr>
-        </p:nvSpPr>
-        <p:spPr>
-          <a:xfrm>
-            <a:off x="2720195" y="598595"/>
-            <a:ext cx="6119004" cy="675864"/>
-          </a:xfrm>
-          <a:prstGeom prst="rect">
-            <a:avLst/>
-          </a:prstGeom>
-          <a:noFill/>
-          <a:ln>
-            <a:noFill/>
-          </a:ln>
-        </p:spPr>
-        <p:txBody>
-          <a:bodyPr spcFirstLastPara="1" wrap="square" lIns="0" tIns="0" rIns="0" bIns="0" anchor="ctr" anchorCtr="0">
-            <a:normAutofit/>
-          </a:bodyPr>
-          <a:lstStyle>
-            <a:lvl1pPr lvl="0" algn="l">
-              <a:lnSpc>
-                <a:spcPct val="100000"/>
-              </a:lnSpc>
-              <a:spcBef>
-                <a:spcPts val="0"/>
-              </a:spcBef>
-              <a:spcAft>
-                <a:spcPts val="0"/>
-              </a:spcAft>
-              <a:buClr>
-                <a:srgbClr val="000000"/>
-              </a:buClr>
-              <a:buSzPts val="1800"/>
-              <a:buNone/>
-              <a:defRPr/>
-            </a:lvl1pPr>
-            <a:lvl2pPr lvl="1" algn="l">
-              <a:lnSpc>
-                <a:spcPct val="100000"/>
-              </a:lnSpc>
-              <a:spcBef>
-                <a:spcPts val="0"/>
-              </a:spcBef>
-              <a:spcAft>
-                <a:spcPts val="0"/>
-              </a:spcAft>
-              <a:buClr>
-                <a:srgbClr val="000000"/>
-              </a:buClr>
-              <a:buSzPts val="1800"/>
-              <a:buNone/>
-              <a:defRPr/>
-            </a:lvl2pPr>
-            <a:lvl3pPr lvl="2" algn="l">
-              <a:lnSpc>
-                <a:spcPct val="100000"/>
-              </a:lnSpc>
-              <a:spcBef>
-                <a:spcPts val="0"/>
-              </a:spcBef>
-              <a:spcAft>
-                <a:spcPts val="0"/>
-              </a:spcAft>
-              <a:buClr>
-                <a:srgbClr val="000000"/>
-              </a:buClr>
-              <a:buSzPts val="1800"/>
-              <a:buNone/>
-              <a:defRPr/>
-            </a:lvl3pPr>
-            <a:lvl4pPr lvl="3" algn="l">
-              <a:lnSpc>
-                <a:spcPct val="100000"/>
-              </a:lnSpc>
-              <a:spcBef>
-                <a:spcPts val="0"/>
-              </a:spcBef>
-              <a:spcAft>
-                <a:spcPts val="0"/>
-              </a:spcAft>
-              <a:buClr>
-                <a:srgbClr val="000000"/>
-              </a:buClr>
-              <a:buSzPts val="1800"/>
-              <a:buNone/>
-              <a:defRPr/>
-            </a:lvl4pPr>
-            <a:lvl5pPr lvl="4" algn="l">
-              <a:lnSpc>
-                <a:spcPct val="100000"/>
-              </a:lnSpc>
-              <a:spcBef>
-                <a:spcPts val="0"/>
-              </a:spcBef>
-              <a:spcAft>
-                <a:spcPts val="0"/>
-              </a:spcAft>
-              <a:buClr>
-                <a:srgbClr val="000000"/>
-              </a:buClr>
-              <a:buSzPts val="1800"/>
-              <a:buNone/>
-              <a:defRPr/>
-            </a:lvl5pPr>
-            <a:lvl6pPr lvl="5" algn="l">
-              <a:lnSpc>
-                <a:spcPct val="100000"/>
-              </a:lnSpc>
-              <a:spcBef>
-                <a:spcPts val="0"/>
-              </a:spcBef>
-              <a:spcAft>
-                <a:spcPts val="0"/>
-              </a:spcAft>
-              <a:buClr>
-                <a:srgbClr val="000000"/>
-              </a:buClr>
-              <a:buSzPts val="1800"/>
-              <a:buNone/>
-              <a:defRPr/>
-            </a:lvl6pPr>
-            <a:lvl7pPr lvl="6" algn="l">
-              <a:lnSpc>
-                <a:spcPct val="100000"/>
-              </a:lnSpc>
-              <a:spcBef>
-                <a:spcPts val="0"/>
-              </a:spcBef>
-              <a:spcAft>
-                <a:spcPts val="0"/>
-              </a:spcAft>
-              <a:buClr>
-                <a:srgbClr val="000000"/>
-              </a:buClr>
-              <a:buSzPts val="1800"/>
-              <a:buNone/>
-              <a:defRPr/>
-            </a:lvl7pPr>
-            <a:lvl8pPr lvl="7" algn="l">
-              <a:lnSpc>
-                <a:spcPct val="100000"/>
-              </a:lnSpc>
-              <a:spcBef>
-                <a:spcPts val="0"/>
-              </a:spcBef>
-              <a:spcAft>
-                <a:spcPts val="0"/>
-              </a:spcAft>
-              <a:buClr>
-                <a:srgbClr val="000000"/>
-              </a:buClr>
-              <a:buSzPts val="1800"/>
-              <a:buNone/>
-              <a:defRPr/>
-            </a:lvl8pPr>
-            <a:lvl9pPr lvl="8" algn="l">
-              <a:lnSpc>
-                <a:spcPct val="100000"/>
-              </a:lnSpc>
-              <a:spcBef>
-                <a:spcPts val="0"/>
-              </a:spcBef>
-              <a:spcAft>
-                <a:spcPts val="0"/>
-              </a:spcAft>
-              <a:buClr>
-                <a:srgbClr val="000000"/>
-              </a:buClr>
-              <a:buSzPts val="1800"/>
-              <a:buNone/>
-              <a:defRPr/>
-            </a:lvl9pPr>
-          </a:lstStyle>
-          <a:p>
-            <a:endParaRPr/>
-          </a:p>
-        </p:txBody>
-      </p:sp>
-      <p:sp>
-        <p:nvSpPr>
-          <p:cNvPr id="70" name="Google Shape;70;p18"/>
-          <p:cNvSpPr txBox="1">
-            <a:spLocks noGrp="1"/>
-          </p:cNvSpPr>
-          <p:nvPr>
-            <p:ph type="sldNum" idx="12"/>
-          </p:nvPr>
-        </p:nvSpPr>
-        <p:spPr>
-          <a:xfrm>
-            <a:off x="4419600" y="4627562"/>
-            <a:ext cx="2133600" cy="279401"/>
-          </a:xfrm>
-          <a:prstGeom prst="rect">
-            <a:avLst/>
-          </a:prstGeom>
-          <a:noFill/>
-          <a:ln>
-            <a:noFill/>
-          </a:ln>
-        </p:spPr>
-        <p:txBody>
-          <a:bodyPr spcFirstLastPara="1" wrap="square" lIns="45700" tIns="45700" rIns="45700" bIns="45700" anchor="ctr" anchorCtr="0">
-            <a:spAutoFit/>
-          </a:bodyPr>
-          <a:lstStyle>
-            <a:lvl1pPr marL="0" lvl="0" indent="0" algn="r">
-              <a:lnSpc>
-                <a:spcPct val="100000"/>
-              </a:lnSpc>
-              <a:spcBef>
-                <a:spcPts val="0"/>
-              </a:spcBef>
-              <a:spcAft>
-                <a:spcPts val="0"/>
-              </a:spcAft>
-              <a:buClr>
-                <a:srgbClr val="000000"/>
-              </a:buClr>
-              <a:buSzPts val="1200"/>
-              <a:buFont typeface="Arial"/>
-              <a:buNone/>
-              <a:defRPr sz="1200"/>
-            </a:lvl1pPr>
-            <a:lvl2pPr marL="0" lvl="1" indent="0" algn="r">
-              <a:lnSpc>
-                <a:spcPct val="100000"/>
-              </a:lnSpc>
-              <a:spcBef>
-                <a:spcPts val="0"/>
-              </a:spcBef>
-              <a:spcAft>
-                <a:spcPts val="0"/>
-              </a:spcAft>
-              <a:buClr>
-                <a:srgbClr val="000000"/>
-              </a:buClr>
-              <a:buSzPts val="1200"/>
-              <a:buFont typeface="Arial"/>
-              <a:buNone/>
-              <a:defRPr sz="1200"/>
-            </a:lvl2pPr>
-            <a:lvl3pPr marL="0" lvl="2" indent="0" algn="r">
-              <a:lnSpc>
-                <a:spcPct val="100000"/>
-              </a:lnSpc>
-              <a:spcBef>
-                <a:spcPts val="0"/>
-              </a:spcBef>
-              <a:spcAft>
-                <a:spcPts val="0"/>
-              </a:spcAft>
-              <a:buClr>
-                <a:srgbClr val="000000"/>
-              </a:buClr>
-              <a:buSzPts val="1200"/>
-              <a:buFont typeface="Arial"/>
-              <a:buNone/>
-              <a:defRPr sz="1200"/>
-            </a:lvl3pPr>
-            <a:lvl4pPr marL="0" lvl="3" indent="0" algn="r">
-              <a:lnSpc>
-                <a:spcPct val="100000"/>
-              </a:lnSpc>
-              <a:spcBef>
-                <a:spcPts val="0"/>
-              </a:spcBef>
-              <a:spcAft>
-                <a:spcPts val="0"/>
-              </a:spcAft>
-              <a:buClr>
-                <a:srgbClr val="000000"/>
-              </a:buClr>
-              <a:buSzPts val="1200"/>
-              <a:buFont typeface="Arial"/>
-              <a:buNone/>
-              <a:defRPr sz="1200"/>
-            </a:lvl4pPr>
-            <a:lvl5pPr marL="0" lvl="4" indent="0" algn="r">
-              <a:lnSpc>
-                <a:spcPct val="100000"/>
-              </a:lnSpc>
-              <a:spcBef>
-                <a:spcPts val="0"/>
-              </a:spcBef>
-              <a:spcAft>
-                <a:spcPts val="0"/>
-              </a:spcAft>
-              <a:buClr>
-                <a:srgbClr val="000000"/>
-              </a:buClr>
-              <a:buSzPts val="1200"/>
-              <a:buFont typeface="Arial"/>
-              <a:buNone/>
-              <a:defRPr sz="1200"/>
-            </a:lvl5pPr>
-            <a:lvl6pPr marL="0" lvl="5" indent="0" algn="r">
-              <a:lnSpc>
-                <a:spcPct val="100000"/>
-              </a:lnSpc>
-              <a:spcBef>
-                <a:spcPts val="0"/>
-              </a:spcBef>
-              <a:spcAft>
-                <a:spcPts val="0"/>
-              </a:spcAft>
-              <a:buClr>
-                <a:srgbClr val="000000"/>
-              </a:buClr>
-              <a:buSzPts val="1200"/>
-              <a:buFont typeface="Arial"/>
-              <a:buNone/>
-              <a:defRPr sz="1200"/>
-            </a:lvl6pPr>
-            <a:lvl7pPr marL="0" lvl="6" indent="0" algn="r">
-              <a:lnSpc>
-                <a:spcPct val="100000"/>
-              </a:lnSpc>
-              <a:spcBef>
-                <a:spcPts val="0"/>
-              </a:spcBef>
-              <a:spcAft>
-                <a:spcPts val="0"/>
-              </a:spcAft>
-              <a:buClr>
-                <a:srgbClr val="000000"/>
-              </a:buClr>
-              <a:buSzPts val="1200"/>
-              <a:buFont typeface="Arial"/>
-              <a:buNone/>
-              <a:defRPr sz="1200"/>
-            </a:lvl7pPr>
-            <a:lvl8pPr marL="0" lvl="7" indent="0" algn="r">
-              <a:lnSpc>
-                <a:spcPct val="100000"/>
-              </a:lnSpc>
-              <a:spcBef>
-                <a:spcPts val="0"/>
-              </a:spcBef>
-              <a:spcAft>
-                <a:spcPts val="0"/>
-              </a:spcAft>
-              <a:buClr>
-                <a:srgbClr val="000000"/>
-              </a:buClr>
-              <a:buSzPts val="1200"/>
-              <a:buFont typeface="Arial"/>
-              <a:buNone/>
-              <a:defRPr sz="1200"/>
-            </a:lvl8pPr>
-            <a:lvl9pPr marL="0" lvl="8" indent="0" algn="r">
-              <a:lnSpc>
-                <a:spcPct val="100000"/>
-              </a:lnSpc>
-              <a:spcBef>
-                <a:spcPts val="0"/>
-              </a:spcBef>
-              <a:spcAft>
-                <a:spcPts val="0"/>
-              </a:spcAft>
-              <a:buClr>
-                <a:srgbClr val="000000"/>
-              </a:buClr>
-              <a:buSzPts val="1200"/>
-              <a:buFont typeface="Arial"/>
-              <a:buNone/>
-              <a:defRPr sz="1200"/>
-            </a:lvl9pPr>
-          </a:lstStyle>
-          <a:p>
-            <a:pPr marL="0" lvl="0" indent="0" algn="r" rtl="0">
-              <a:spcBef>
-                <a:spcPts val="0"/>
-              </a:spcBef>
-              <a:spcAft>
-                <a:spcPts val="0"/>
-              </a:spcAft>
-              <a:buNone/>
-            </a:pPr>
-            <a:fld id="{00000000-1234-1234-1234-123412341234}" type="slidenum">
-              <a:rPr lang="en"/>
-              <a:t>‹#›</a:t>
-            </a:fld>
-            <a:endParaRPr/>
-          </a:p>
-        </p:txBody>
-      </p:sp>
-    </p:spTree>
-  </p:cSld>
-  <p:clrMapOvr>
-    <a:masterClrMapping/>
-  </p:clrMapOvr>
-</p:sldLayout>
-</file>
-
-<file path=ppt/slideLayouts/slideLayout2.xml><?xml version="1.0" encoding="utf-8"?>
 <p:sldLayout xmlns:a="http://schemas.openxmlformats.org/drawingml/2006/main" xmlns:r="http://schemas.openxmlformats.org/officeDocument/2006/relationships" xmlns:p="http://schemas.openxmlformats.org/presentationml/2006/main" matchingName="Title and Content">
-  <p:cSld name="Title and Content">
-    <p:bg>
-      <p:bgPr>
-        <a:blipFill>
-          <a:blip r:embed="rId2" cstate="print">
-            <a:alphaModFix/>
-            <a:extLst>
-              <a:ext uri="{28A0092B-C50C-407E-A947-70E740481C1C}">
-                <a14:useLocalDpi xmlns:a14="http://schemas.microsoft.com/office/drawing/2010/main"/>
-              </a:ext>
-            </a:extLst>
-          </a:blip>
-          <a:stretch>
-            <a:fillRect/>
-          </a:stretch>
-        </a:blipFill>
-        <a:effectLst/>
-      </p:bgPr>
-    </p:bg>
+  <p:cSld name="1_Title and Content">
     <p:spTree>
       <p:nvGrpSpPr>
         <p:cNvPr id="1" name="Shape 56"/>
@@ -5061,7 +4934,7 @@
     </p:spTree>
     <p:extLst>
       <p:ext uri="{BB962C8B-B14F-4D97-AF65-F5344CB8AC3E}">
-        <p14:creationId xmlns:p14="http://schemas.microsoft.com/office/powerpoint/2010/main" val="742584778"/>
+        <p14:creationId xmlns:p14="http://schemas.microsoft.com/office/powerpoint/2010/main" val="3963360887"/>
       </p:ext>
     </p:extLst>
   </p:cSld>
@@ -5071,24 +4944,14 @@
 </p:sldLayout>
 </file>
 
-<file path=ppt/slideLayouts/slideLayout3.xml><?xml version="1.0" encoding="utf-8"?>
+<file path=ppt/slideLayouts/slideLayout2.xml><?xml version="1.0" encoding="utf-8"?>
 <p:sldLayout xmlns:a="http://schemas.openxmlformats.org/drawingml/2006/main" xmlns:r="http://schemas.openxmlformats.org/officeDocument/2006/relationships" xmlns:p="http://schemas.openxmlformats.org/presentationml/2006/main" matchingName="Title Slide">
-  <p:cSld name="Title Slide">
+  <p:cSld name="1_Title Slide">
     <p:bg>
       <p:bgPr>
-        <a:blipFill>
-          <a:blip r:embed="rId2" cstate="print">
-            <a:alphaModFix/>
-            <a:extLst>
-              <a:ext uri="{28A0092B-C50C-407E-A947-70E740481C1C}">
-                <a14:useLocalDpi xmlns:a14="http://schemas.microsoft.com/office/drawing/2010/main"/>
-              </a:ext>
-            </a:extLst>
-          </a:blip>
-          <a:stretch>
-            <a:fillRect/>
-          </a:stretch>
-        </a:blipFill>
+        <a:solidFill>
+          <a:schemeClr val="bg1"/>
+        </a:solidFill>
         <a:effectLst/>
       </p:bgPr>
     </p:bg>
@@ -5152,7 +5015,7 @@
               <a:buNone/>
               <a:defRPr sz="3600">
                 <a:solidFill>
-                  <a:srgbClr val="FFFFFF"/>
+                  <a:schemeClr val="tx1"/>
                 </a:solidFill>
               </a:defRPr>
             </a:lvl1pPr>
@@ -5344,7 +5207,7 @@
               <a:buNone/>
               <a:defRPr sz="2200">
                 <a:solidFill>
-                  <a:srgbClr val="FFFFFF"/>
+                  <a:schemeClr val="tx1"/>
                 </a:solidFill>
               </a:defRPr>
             </a:lvl1pPr>
@@ -5554,7 +5417,11 @@
               <a:buSzPts val="1200"/>
               <a:buFont typeface="Arial"/>
               <a:buNone/>
-              <a:defRPr sz="1200"/>
+              <a:defRPr sz="1200">
+                <a:solidFill>
+                  <a:schemeClr val="tx1"/>
+                </a:solidFill>
+              </a:defRPr>
             </a:lvl1pPr>
             <a:lvl2pPr marL="0" lvl="1" indent="0" algn="r">
               <a:lnSpc>
@@ -5702,27 +5569,19 @@
             </a:lvl9pPr>
           </a:lstStyle>
           <a:p>
-            <a:pPr marL="0" lvl="0" indent="0" algn="r" rtl="0">
-              <a:spcBef>
-                <a:spcPts val="0"/>
-              </a:spcBef>
-              <a:spcAft>
-                <a:spcPts val="0"/>
-              </a:spcAft>
-              <a:buNone/>
-            </a:pPr>
             <a:fld id="{00000000-1234-1234-1234-123412341234}" type="slidenum">
-              <a:rPr lang="en"/>
+              <a:rPr lang="en" smtClean="0"/>
+              <a:pPr/>
               <a:t>‹#›</a:t>
             </a:fld>
-            <a:endParaRPr/>
+            <a:endParaRPr lang="en"/>
           </a:p>
         </p:txBody>
       </p:sp>
     </p:spTree>
     <p:extLst>
       <p:ext uri="{BB962C8B-B14F-4D97-AF65-F5344CB8AC3E}">
-        <p14:creationId xmlns:p14="http://schemas.microsoft.com/office/powerpoint/2010/main" val="2552332935"/>
+        <p14:creationId xmlns:p14="http://schemas.microsoft.com/office/powerpoint/2010/main" val="1139353765"/>
       </p:ext>
     </p:extLst>
   </p:cSld>
@@ -5732,24 +5591,14 @@
 </p:sldLayout>
 </file>
 
-<file path=ppt/slideLayouts/slideLayout4.xml><?xml version="1.0" encoding="utf-8"?>
+<file path=ppt/slideLayouts/slideLayout3.xml><?xml version="1.0" encoding="utf-8"?>
 <p:sldLayout xmlns:a="http://schemas.openxmlformats.org/drawingml/2006/main" xmlns:r="http://schemas.openxmlformats.org/officeDocument/2006/relationships" xmlns:p="http://schemas.openxmlformats.org/presentationml/2006/main" matchingName="7_Picture with Caption">
   <p:cSld name="7_Picture with Caption">
     <p:bg>
       <p:bgPr>
-        <a:blipFill>
-          <a:blip r:embed="rId2" cstate="print">
-            <a:alphaModFix/>
-            <a:extLst>
-              <a:ext uri="{28A0092B-C50C-407E-A947-70E740481C1C}">
-                <a14:useLocalDpi xmlns:a14="http://schemas.microsoft.com/office/drawing/2010/main"/>
-              </a:ext>
-            </a:extLst>
-          </a:blip>
-          <a:stretch>
-            <a:fillRect/>
-          </a:stretch>
-        </a:blipFill>
+        <a:solidFill>
+          <a:schemeClr val="bg1"/>
+        </a:solidFill>
         <a:effectLst/>
       </p:bgPr>
     </p:bg>
@@ -6357,7 +6206,7 @@
           <p:nvPr userDrawn="1"/>
         </p:nvPicPr>
         <p:blipFill>
-          <a:blip r:embed="rId3" cstate="print">
+          <a:blip r:embed="rId2" cstate="print">
             <a:alphaModFix/>
             <a:extLst>
               <a:ext uri="{28A0092B-C50C-407E-A947-70E740481C1C}">
@@ -6385,7 +6234,7 @@
     </p:spTree>
     <p:extLst>
       <p:ext uri="{BB962C8B-B14F-4D97-AF65-F5344CB8AC3E}">
-        <p14:creationId xmlns:p14="http://schemas.microsoft.com/office/powerpoint/2010/main" val="844928206"/>
+        <p14:creationId xmlns:p14="http://schemas.microsoft.com/office/powerpoint/2010/main" val="425107887"/>
       </p:ext>
     </p:extLst>
   </p:cSld>
@@ -6399,26 +6248,13 @@
 <p:sldMaster xmlns:a="http://schemas.openxmlformats.org/drawingml/2006/main" xmlns:r="http://schemas.openxmlformats.org/officeDocument/2006/relationships" xmlns:p="http://schemas.openxmlformats.org/presentationml/2006/main">
   <p:cSld>
     <p:bg>
-      <p:bgPr>
-        <a:blipFill>
-          <a:blip r:embed="rId6" cstate="print">
-            <a:alphaModFix/>
-            <a:extLst>
-              <a:ext uri="{28A0092B-C50C-407E-A947-70E740481C1C}">
-                <a14:useLocalDpi xmlns:a14="http://schemas.microsoft.com/office/drawing/2010/main"/>
-              </a:ext>
-            </a:extLst>
-          </a:blip>
-          <a:stretch>
-            <a:fillRect/>
-          </a:stretch>
-        </a:blipFill>
-        <a:effectLst/>
-      </p:bgPr>
+      <p:bgRef idx="1001">
+        <a:schemeClr val="bg1"/>
+      </p:bgRef>
     </p:bg>
     <p:spTree>
       <p:nvGrpSpPr>
-        <p:cNvPr id="1" name="Shape 50"/>
+        <p:cNvPr id="1" name=""/>
         <p:cNvGrpSpPr/>
         <p:nvPr/>
       </p:nvGrpSpPr>
@@ -6432,8 +6268,14 @@
       </p:grpSpPr>
       <p:sp>
         <p:nvSpPr>
-          <p:cNvPr id="51" name="Google Shape;51;p13"/>
-          <p:cNvSpPr txBox="1">
+          <p:cNvPr id="2" name="Title Placeholder 1">
+            <a:extLst>
+              <a:ext uri="{FF2B5EF4-FFF2-40B4-BE49-F238E27FC236}">
+                <a16:creationId xmlns:a16="http://schemas.microsoft.com/office/drawing/2014/main" id="{FDFC0215-FC83-3984-532B-7109B7C25985}"/>
+              </a:ext>
+            </a:extLst>
+          </p:cNvPr>
+          <p:cNvSpPr>
             <a:spLocks noGrp="1"/>
           </p:cNvSpPr>
           <p:nvPr>
@@ -6442,266 +6284,36 @@
         </p:nvSpPr>
         <p:spPr>
           <a:xfrm>
-            <a:off x="457200" y="69056"/>
-            <a:ext cx="8229600" cy="1131094"/>
+            <a:off x="628650" y="273844"/>
+            <a:ext cx="7886700" cy="994172"/>
           </a:xfrm>
           <a:prstGeom prst="rect">
             <a:avLst/>
           </a:prstGeom>
-          <a:noFill/>
-          <a:ln>
-            <a:noFill/>
-          </a:ln>
         </p:spPr>
         <p:txBody>
-          <a:bodyPr spcFirstLastPara="1" wrap="square" lIns="0" tIns="0" rIns="0" bIns="0" anchor="ctr" anchorCtr="0">
-            <a:noAutofit/>
+          <a:bodyPr vert="horz" lIns="91440" tIns="45720" rIns="91440" bIns="45720" rtlCol="0" anchor="ctr">
+            <a:normAutofit/>
           </a:bodyPr>
-          <a:lstStyle>
-            <a:lvl1pPr marR="0" lvl="0" algn="l" rtl="0">
-              <a:lnSpc>
-                <a:spcPct val="100000"/>
-              </a:lnSpc>
-              <a:spcBef>
-                <a:spcPts val="0"/>
-              </a:spcBef>
-              <a:spcAft>
-                <a:spcPts val="0"/>
-              </a:spcAft>
-              <a:buClr>
-                <a:srgbClr val="000000"/>
-              </a:buClr>
-              <a:buSzPts val="2400"/>
-              <a:buFont typeface="Roboto"/>
-              <a:buNone/>
-              <a:defRPr sz="2400" b="1" i="0" u="none" strike="noStrike" cap="none">
-                <a:solidFill>
-                  <a:srgbClr val="000000"/>
-                </a:solidFill>
-                <a:latin typeface="Roboto"/>
-                <a:ea typeface="Roboto"/>
-                <a:cs typeface="Roboto"/>
-                <a:sym typeface="Roboto"/>
-              </a:defRPr>
-            </a:lvl1pPr>
-            <a:lvl2pPr marR="0" lvl="1" algn="l" rtl="0">
-              <a:lnSpc>
-                <a:spcPct val="100000"/>
-              </a:lnSpc>
-              <a:spcBef>
-                <a:spcPts val="0"/>
-              </a:spcBef>
-              <a:spcAft>
-                <a:spcPts val="0"/>
-              </a:spcAft>
-              <a:buClr>
-                <a:srgbClr val="000000"/>
-              </a:buClr>
-              <a:buSzPts val="2400"/>
-              <a:buFont typeface="Roboto"/>
-              <a:buNone/>
-              <a:defRPr sz="2400" b="1" i="0" u="none" strike="noStrike" cap="none">
-                <a:solidFill>
-                  <a:srgbClr val="000000"/>
-                </a:solidFill>
-                <a:latin typeface="Roboto"/>
-                <a:ea typeface="Roboto"/>
-                <a:cs typeface="Roboto"/>
-                <a:sym typeface="Roboto"/>
-              </a:defRPr>
-            </a:lvl2pPr>
-            <a:lvl3pPr marR="0" lvl="2" algn="l" rtl="0">
-              <a:lnSpc>
-                <a:spcPct val="100000"/>
-              </a:lnSpc>
-              <a:spcBef>
-                <a:spcPts val="0"/>
-              </a:spcBef>
-              <a:spcAft>
-                <a:spcPts val="0"/>
-              </a:spcAft>
-              <a:buClr>
-                <a:srgbClr val="000000"/>
-              </a:buClr>
-              <a:buSzPts val="2400"/>
-              <a:buFont typeface="Roboto"/>
-              <a:buNone/>
-              <a:defRPr sz="2400" b="1" i="0" u="none" strike="noStrike" cap="none">
-                <a:solidFill>
-                  <a:srgbClr val="000000"/>
-                </a:solidFill>
-                <a:latin typeface="Roboto"/>
-                <a:ea typeface="Roboto"/>
-                <a:cs typeface="Roboto"/>
-                <a:sym typeface="Roboto"/>
-              </a:defRPr>
-            </a:lvl3pPr>
-            <a:lvl4pPr marR="0" lvl="3" algn="l" rtl="0">
-              <a:lnSpc>
-                <a:spcPct val="100000"/>
-              </a:lnSpc>
-              <a:spcBef>
-                <a:spcPts val="0"/>
-              </a:spcBef>
-              <a:spcAft>
-                <a:spcPts val="0"/>
-              </a:spcAft>
-              <a:buClr>
-                <a:srgbClr val="000000"/>
-              </a:buClr>
-              <a:buSzPts val="2400"/>
-              <a:buFont typeface="Roboto"/>
-              <a:buNone/>
-              <a:defRPr sz="2400" b="1" i="0" u="none" strike="noStrike" cap="none">
-                <a:solidFill>
-                  <a:srgbClr val="000000"/>
-                </a:solidFill>
-                <a:latin typeface="Roboto"/>
-                <a:ea typeface="Roboto"/>
-                <a:cs typeface="Roboto"/>
-                <a:sym typeface="Roboto"/>
-              </a:defRPr>
-            </a:lvl4pPr>
-            <a:lvl5pPr marR="0" lvl="4" algn="l" rtl="0">
-              <a:lnSpc>
-                <a:spcPct val="100000"/>
-              </a:lnSpc>
-              <a:spcBef>
-                <a:spcPts val="0"/>
-              </a:spcBef>
-              <a:spcAft>
-                <a:spcPts val="0"/>
-              </a:spcAft>
-              <a:buClr>
-                <a:srgbClr val="000000"/>
-              </a:buClr>
-              <a:buSzPts val="2400"/>
-              <a:buFont typeface="Roboto"/>
-              <a:buNone/>
-              <a:defRPr sz="2400" b="1" i="0" u="none" strike="noStrike" cap="none">
-                <a:solidFill>
-                  <a:srgbClr val="000000"/>
-                </a:solidFill>
-                <a:latin typeface="Roboto"/>
-                <a:ea typeface="Roboto"/>
-                <a:cs typeface="Roboto"/>
-                <a:sym typeface="Roboto"/>
-              </a:defRPr>
-            </a:lvl5pPr>
-            <a:lvl6pPr marR="0" lvl="5" algn="l" rtl="0">
-              <a:lnSpc>
-                <a:spcPct val="100000"/>
-              </a:lnSpc>
-              <a:spcBef>
-                <a:spcPts val="0"/>
-              </a:spcBef>
-              <a:spcAft>
-                <a:spcPts val="0"/>
-              </a:spcAft>
-              <a:buClr>
-                <a:srgbClr val="000000"/>
-              </a:buClr>
-              <a:buSzPts val="2400"/>
-              <a:buFont typeface="Roboto"/>
-              <a:buNone/>
-              <a:defRPr sz="2400" b="1" i="0" u="none" strike="noStrike" cap="none">
-                <a:solidFill>
-                  <a:srgbClr val="000000"/>
-                </a:solidFill>
-                <a:latin typeface="Roboto"/>
-                <a:ea typeface="Roboto"/>
-                <a:cs typeface="Roboto"/>
-                <a:sym typeface="Roboto"/>
-              </a:defRPr>
-            </a:lvl6pPr>
-            <a:lvl7pPr marR="0" lvl="6" algn="l" rtl="0">
-              <a:lnSpc>
-                <a:spcPct val="100000"/>
-              </a:lnSpc>
-              <a:spcBef>
-                <a:spcPts val="0"/>
-              </a:spcBef>
-              <a:spcAft>
-                <a:spcPts val="0"/>
-              </a:spcAft>
-              <a:buClr>
-                <a:srgbClr val="000000"/>
-              </a:buClr>
-              <a:buSzPts val="2400"/>
-              <a:buFont typeface="Roboto"/>
-              <a:buNone/>
-              <a:defRPr sz="2400" b="1" i="0" u="none" strike="noStrike" cap="none">
-                <a:solidFill>
-                  <a:srgbClr val="000000"/>
-                </a:solidFill>
-                <a:latin typeface="Roboto"/>
-                <a:ea typeface="Roboto"/>
-                <a:cs typeface="Roboto"/>
-                <a:sym typeface="Roboto"/>
-              </a:defRPr>
-            </a:lvl7pPr>
-            <a:lvl8pPr marR="0" lvl="7" algn="l" rtl="0">
-              <a:lnSpc>
-                <a:spcPct val="100000"/>
-              </a:lnSpc>
-              <a:spcBef>
-                <a:spcPts val="0"/>
-              </a:spcBef>
-              <a:spcAft>
-                <a:spcPts val="0"/>
-              </a:spcAft>
-              <a:buClr>
-                <a:srgbClr val="000000"/>
-              </a:buClr>
-              <a:buSzPts val="2400"/>
-              <a:buFont typeface="Roboto"/>
-              <a:buNone/>
-              <a:defRPr sz="2400" b="1" i="0" u="none" strike="noStrike" cap="none">
-                <a:solidFill>
-                  <a:srgbClr val="000000"/>
-                </a:solidFill>
-                <a:latin typeface="Roboto"/>
-                <a:ea typeface="Roboto"/>
-                <a:cs typeface="Roboto"/>
-                <a:sym typeface="Roboto"/>
-              </a:defRPr>
-            </a:lvl8pPr>
-            <a:lvl9pPr marR="0" lvl="8" algn="l" rtl="0">
-              <a:lnSpc>
-                <a:spcPct val="100000"/>
-              </a:lnSpc>
-              <a:spcBef>
-                <a:spcPts val="0"/>
-              </a:spcBef>
-              <a:spcAft>
-                <a:spcPts val="0"/>
-              </a:spcAft>
-              <a:buClr>
-                <a:srgbClr val="000000"/>
-              </a:buClr>
-              <a:buSzPts val="2400"/>
-              <a:buFont typeface="Roboto"/>
-              <a:buNone/>
-              <a:defRPr sz="2400" b="1" i="0" u="none" strike="noStrike" cap="none">
-                <a:solidFill>
-                  <a:srgbClr val="000000"/>
-                </a:solidFill>
-                <a:latin typeface="Roboto"/>
-                <a:ea typeface="Roboto"/>
-                <a:cs typeface="Roboto"/>
-                <a:sym typeface="Roboto"/>
-              </a:defRPr>
-            </a:lvl9pPr>
-          </a:lstStyle>
-          <a:p>
-            <a:endParaRPr/>
+          <a:lstStyle/>
+          <a:p>
+            <a:r>
+              <a:rPr lang="en-US"/>
+              <a:t>Click to edit Master title style</a:t>
+            </a:r>
           </a:p>
         </p:txBody>
       </p:sp>
       <p:sp>
         <p:nvSpPr>
-          <p:cNvPr id="52" name="Google Shape;52;p13"/>
-          <p:cNvSpPr txBox="1">
+          <p:cNvPr id="3" name="Text Placeholder 2">
+            <a:extLst>
+              <a:ext uri="{FF2B5EF4-FFF2-40B4-BE49-F238E27FC236}">
+                <a16:creationId xmlns:a16="http://schemas.microsoft.com/office/drawing/2014/main" id="{B8345077-EB89-0091-466D-921C95B7B9D5}"/>
+              </a:ext>
+            </a:extLst>
+          </p:cNvPr>
+          <p:cNvSpPr>
             <a:spLocks noGrp="1"/>
           </p:cNvSpPr>
           <p:nvPr>
@@ -6710,524 +6322,182 @@
         </p:nvSpPr>
         <p:spPr>
           <a:xfrm>
-            <a:off x="457200" y="1200150"/>
-            <a:ext cx="8229600" cy="3943350"/>
+            <a:off x="628650" y="1369219"/>
+            <a:ext cx="7886700" cy="3263504"/>
           </a:xfrm>
           <a:prstGeom prst="rect">
             <a:avLst/>
           </a:prstGeom>
-          <a:noFill/>
-          <a:ln>
-            <a:noFill/>
-          </a:ln>
         </p:spPr>
         <p:txBody>
-          <a:bodyPr spcFirstLastPara="1" wrap="square" lIns="45700" tIns="45700" rIns="45700" bIns="45700" anchor="t" anchorCtr="0">
+          <a:bodyPr vert="horz" lIns="91440" tIns="45720" rIns="91440" bIns="45720" rtlCol="0">
             <a:normAutofit/>
           </a:bodyPr>
-          <a:lstStyle>
-            <a:lvl1pPr marL="457200" marR="0" lvl="0" indent="-228600" algn="l" rtl="0">
-              <a:lnSpc>
-                <a:spcPct val="100000"/>
-              </a:lnSpc>
-              <a:spcBef>
-                <a:spcPts val="600"/>
-              </a:spcBef>
-              <a:spcAft>
-                <a:spcPts val="0"/>
-              </a:spcAft>
-              <a:buClr>
-                <a:srgbClr val="000000"/>
-              </a:buClr>
-              <a:buSzPts val="2000"/>
-              <a:buFont typeface="Roboto"/>
-              <a:buNone/>
-              <a:defRPr sz="2000" b="0" i="0" u="none" strike="noStrike" cap="none">
-                <a:solidFill>
-                  <a:srgbClr val="000000"/>
-                </a:solidFill>
-                <a:latin typeface="Roboto"/>
-                <a:ea typeface="Roboto"/>
-                <a:cs typeface="Roboto"/>
-                <a:sym typeface="Roboto"/>
-              </a:defRPr>
-            </a:lvl1pPr>
-            <a:lvl2pPr marL="914400" marR="0" lvl="1" indent="-355600" algn="l" rtl="0">
-              <a:lnSpc>
-                <a:spcPct val="100000"/>
-              </a:lnSpc>
-              <a:spcBef>
-                <a:spcPts val="600"/>
-              </a:spcBef>
-              <a:spcAft>
-                <a:spcPts val="0"/>
-              </a:spcAft>
-              <a:buClr>
-                <a:srgbClr val="000000"/>
-              </a:buClr>
-              <a:buSzPts val="2000"/>
-              <a:buFont typeface="Roboto"/>
-              <a:buChar char="•"/>
-              <a:defRPr sz="2000" b="0" i="0" u="none" strike="noStrike" cap="none">
-                <a:solidFill>
-                  <a:srgbClr val="000000"/>
-                </a:solidFill>
-                <a:latin typeface="Roboto"/>
-                <a:ea typeface="Roboto"/>
-                <a:cs typeface="Roboto"/>
-                <a:sym typeface="Roboto"/>
-              </a:defRPr>
-            </a:lvl2pPr>
-            <a:lvl3pPr marL="1371600" marR="0" lvl="2" indent="-355600" algn="l" rtl="0">
-              <a:lnSpc>
-                <a:spcPct val="100000"/>
-              </a:lnSpc>
-              <a:spcBef>
-                <a:spcPts val="600"/>
-              </a:spcBef>
-              <a:spcAft>
-                <a:spcPts val="0"/>
-              </a:spcAft>
-              <a:buClr>
-                <a:srgbClr val="000000"/>
-              </a:buClr>
-              <a:buSzPts val="2000"/>
-              <a:buFont typeface="Roboto"/>
-              <a:buChar char="•"/>
-              <a:defRPr sz="2000" b="0" i="0" u="none" strike="noStrike" cap="none">
-                <a:solidFill>
-                  <a:srgbClr val="000000"/>
-                </a:solidFill>
-                <a:latin typeface="Roboto"/>
-                <a:ea typeface="Roboto"/>
-                <a:cs typeface="Roboto"/>
-                <a:sym typeface="Roboto"/>
-              </a:defRPr>
-            </a:lvl3pPr>
-            <a:lvl4pPr marL="1828800" marR="0" lvl="3" indent="-355600" algn="l" rtl="0">
-              <a:lnSpc>
-                <a:spcPct val="100000"/>
-              </a:lnSpc>
-              <a:spcBef>
-                <a:spcPts val="600"/>
-              </a:spcBef>
-              <a:spcAft>
-                <a:spcPts val="0"/>
-              </a:spcAft>
-              <a:buClr>
-                <a:srgbClr val="000000"/>
-              </a:buClr>
-              <a:buSzPts val="2000"/>
-              <a:buFont typeface="Roboto"/>
-              <a:buChar char="•"/>
-              <a:defRPr sz="2000" b="0" i="0" u="none" strike="noStrike" cap="none">
-                <a:solidFill>
-                  <a:srgbClr val="000000"/>
-                </a:solidFill>
-                <a:latin typeface="Roboto"/>
-                <a:ea typeface="Roboto"/>
-                <a:cs typeface="Roboto"/>
-                <a:sym typeface="Roboto"/>
-              </a:defRPr>
-            </a:lvl4pPr>
-            <a:lvl5pPr marL="2286000" marR="0" lvl="4" indent="-355600" algn="l" rtl="0">
-              <a:lnSpc>
-                <a:spcPct val="100000"/>
-              </a:lnSpc>
-              <a:spcBef>
-                <a:spcPts val="600"/>
-              </a:spcBef>
-              <a:spcAft>
-                <a:spcPts val="0"/>
-              </a:spcAft>
-              <a:buClr>
-                <a:srgbClr val="000000"/>
-              </a:buClr>
-              <a:buSzPts val="2000"/>
-              <a:buFont typeface="Roboto"/>
-              <a:buChar char="•"/>
-              <a:defRPr sz="2000" b="0" i="0" u="none" strike="noStrike" cap="none">
-                <a:solidFill>
-                  <a:srgbClr val="000000"/>
-                </a:solidFill>
-                <a:latin typeface="Roboto"/>
-                <a:ea typeface="Roboto"/>
-                <a:cs typeface="Roboto"/>
-                <a:sym typeface="Roboto"/>
-              </a:defRPr>
-            </a:lvl5pPr>
-            <a:lvl6pPr marL="2743200" marR="0" lvl="5" indent="-355600" algn="l" rtl="0">
-              <a:lnSpc>
-                <a:spcPct val="100000"/>
-              </a:lnSpc>
-              <a:spcBef>
-                <a:spcPts val="600"/>
-              </a:spcBef>
-              <a:spcAft>
-                <a:spcPts val="0"/>
-              </a:spcAft>
-              <a:buClr>
-                <a:srgbClr val="000000"/>
-              </a:buClr>
-              <a:buSzPts val="2000"/>
-              <a:buFont typeface="Roboto"/>
-              <a:buChar char="•"/>
-              <a:defRPr sz="2000" b="0" i="0" u="none" strike="noStrike" cap="none">
-                <a:solidFill>
-                  <a:srgbClr val="000000"/>
-                </a:solidFill>
-                <a:latin typeface="Roboto"/>
-                <a:ea typeface="Roboto"/>
-                <a:cs typeface="Roboto"/>
-                <a:sym typeface="Roboto"/>
-              </a:defRPr>
-            </a:lvl6pPr>
-            <a:lvl7pPr marL="3200400" marR="0" lvl="6" indent="-355600" algn="l" rtl="0">
-              <a:lnSpc>
-                <a:spcPct val="100000"/>
-              </a:lnSpc>
-              <a:spcBef>
-                <a:spcPts val="600"/>
-              </a:spcBef>
-              <a:spcAft>
-                <a:spcPts val="0"/>
-              </a:spcAft>
-              <a:buClr>
-                <a:srgbClr val="000000"/>
-              </a:buClr>
-              <a:buSzPts val="2000"/>
-              <a:buFont typeface="Roboto"/>
-              <a:buChar char="•"/>
-              <a:defRPr sz="2000" b="0" i="0" u="none" strike="noStrike" cap="none">
-                <a:solidFill>
-                  <a:srgbClr val="000000"/>
-                </a:solidFill>
-                <a:latin typeface="Roboto"/>
-                <a:ea typeface="Roboto"/>
-                <a:cs typeface="Roboto"/>
-                <a:sym typeface="Roboto"/>
-              </a:defRPr>
-            </a:lvl7pPr>
-            <a:lvl8pPr marL="3657600" marR="0" lvl="7" indent="-355600" algn="l" rtl="0">
-              <a:lnSpc>
-                <a:spcPct val="100000"/>
-              </a:lnSpc>
-              <a:spcBef>
-                <a:spcPts val="600"/>
-              </a:spcBef>
-              <a:spcAft>
-                <a:spcPts val="0"/>
-              </a:spcAft>
-              <a:buClr>
-                <a:srgbClr val="000000"/>
-              </a:buClr>
-              <a:buSzPts val="2000"/>
-              <a:buFont typeface="Roboto"/>
-              <a:buChar char="•"/>
-              <a:defRPr sz="2000" b="0" i="0" u="none" strike="noStrike" cap="none">
-                <a:solidFill>
-                  <a:srgbClr val="000000"/>
-                </a:solidFill>
-                <a:latin typeface="Roboto"/>
-                <a:ea typeface="Roboto"/>
-                <a:cs typeface="Roboto"/>
-                <a:sym typeface="Roboto"/>
-              </a:defRPr>
-            </a:lvl8pPr>
-            <a:lvl9pPr marL="4114800" marR="0" lvl="8" indent="-355600" algn="l" rtl="0">
-              <a:lnSpc>
-                <a:spcPct val="100000"/>
-              </a:lnSpc>
-              <a:spcBef>
-                <a:spcPts val="600"/>
-              </a:spcBef>
-              <a:spcAft>
-                <a:spcPts val="0"/>
-              </a:spcAft>
-              <a:buClr>
-                <a:srgbClr val="000000"/>
-              </a:buClr>
-              <a:buSzPts val="2000"/>
-              <a:buFont typeface="Roboto"/>
-              <a:buChar char="•"/>
-              <a:defRPr sz="2000" b="0" i="0" u="none" strike="noStrike" cap="none">
-                <a:solidFill>
-                  <a:srgbClr val="000000"/>
-                </a:solidFill>
-                <a:latin typeface="Roboto"/>
-                <a:ea typeface="Roboto"/>
-                <a:cs typeface="Roboto"/>
-                <a:sym typeface="Roboto"/>
-              </a:defRPr>
-            </a:lvl9pPr>
-          </a:lstStyle>
-          <a:p>
-            <a:endParaRPr/>
+          <a:lstStyle/>
+          <a:p>
+            <a:pPr lvl="0"/>
+            <a:r>
+              <a:rPr lang="en-US"/>
+              <a:t>Click to edit Master text styles</a:t>
+            </a:r>
+          </a:p>
+          <a:p>
+            <a:pPr lvl="1"/>
+            <a:r>
+              <a:rPr lang="en-US"/>
+              <a:t>Second level</a:t>
+            </a:r>
+          </a:p>
+          <a:p>
+            <a:pPr lvl="2"/>
+            <a:r>
+              <a:rPr lang="en-US"/>
+              <a:t>Third level</a:t>
+            </a:r>
+          </a:p>
+          <a:p>
+            <a:pPr lvl="3"/>
+            <a:r>
+              <a:rPr lang="en-US"/>
+              <a:t>Fourth level</a:t>
+            </a:r>
+          </a:p>
+          <a:p>
+            <a:pPr lvl="4"/>
+            <a:r>
+              <a:rPr lang="en-US"/>
+              <a:t>Fifth level</a:t>
+            </a:r>
           </a:p>
         </p:txBody>
       </p:sp>
       <p:sp>
         <p:nvSpPr>
-          <p:cNvPr id="53" name="Google Shape;53;p13"/>
-          <p:cNvSpPr txBox="1">
+          <p:cNvPr id="4" name="Date Placeholder 3">
+            <a:extLst>
+              <a:ext uri="{FF2B5EF4-FFF2-40B4-BE49-F238E27FC236}">
+                <a16:creationId xmlns:a16="http://schemas.microsoft.com/office/drawing/2014/main" id="{BA424361-B3F3-7BD8-7D37-B1E1057ABFC4}"/>
+              </a:ext>
+            </a:extLst>
+          </p:cNvPr>
+          <p:cNvSpPr>
             <a:spLocks noGrp="1"/>
           </p:cNvSpPr>
           <p:nvPr>
-            <p:ph type="sldNum" idx="12"/>
+            <p:ph type="dt" sz="half" idx="2"/>
           </p:nvPr>
         </p:nvSpPr>
         <p:spPr>
           <a:xfrm>
-            <a:off x="4419600" y="4627562"/>
-            <a:ext cx="2133600" cy="279401"/>
+            <a:off x="628650" y="4767263"/>
+            <a:ext cx="2057400" cy="273844"/>
           </a:xfrm>
           <a:prstGeom prst="rect">
             <a:avLst/>
           </a:prstGeom>
-          <a:noFill/>
-          <a:ln>
-            <a:noFill/>
-          </a:ln>
         </p:spPr>
         <p:txBody>
-          <a:bodyPr spcFirstLastPara="1" wrap="square" lIns="45700" tIns="45700" rIns="45700" bIns="45700" anchor="ctr" anchorCtr="0">
-            <a:spAutoFit/>
-          </a:bodyPr>
+          <a:bodyPr vert="horz" lIns="91440" tIns="45720" rIns="91440" bIns="45720" rtlCol="0" anchor="ctr"/>
           <a:lstStyle>
-            <a:lvl1pPr marL="0" marR="0" lvl="0" indent="0" algn="r" rtl="0">
-              <a:lnSpc>
-                <a:spcPct val="100000"/>
-              </a:lnSpc>
-              <a:spcBef>
-                <a:spcPts val="0"/>
-              </a:spcBef>
-              <a:spcAft>
-                <a:spcPts val="0"/>
-              </a:spcAft>
-              <a:buClr>
-                <a:srgbClr val="000000"/>
-              </a:buClr>
-              <a:buSzPts val="1200"/>
-              <a:buFont typeface="Arial"/>
-              <a:buNone/>
-              <a:defRPr sz="1200" b="0" i="0" u="none" strike="noStrike" cap="none">
+            <a:lvl1pPr algn="l">
+              <a:defRPr sz="900">
                 <a:solidFill>
-                  <a:srgbClr val="000000"/>
+                  <a:schemeClr val="tx1">
+                    <a:tint val="75000"/>
+                  </a:schemeClr>
                 </a:solidFill>
-                <a:latin typeface="Arial"/>
-                <a:ea typeface="Arial"/>
-                <a:cs typeface="Arial"/>
-                <a:sym typeface="Arial"/>
               </a:defRPr>
             </a:lvl1pPr>
-            <a:lvl2pPr marL="0" marR="0" lvl="1" indent="0" algn="r" rtl="0">
-              <a:lnSpc>
-                <a:spcPct val="100000"/>
-              </a:lnSpc>
-              <a:spcBef>
-                <a:spcPts val="0"/>
-              </a:spcBef>
-              <a:spcAft>
-                <a:spcPts val="0"/>
-              </a:spcAft>
-              <a:buClr>
-                <a:srgbClr val="000000"/>
-              </a:buClr>
-              <a:buSzPts val="1200"/>
-              <a:buFont typeface="Arial"/>
-              <a:buNone/>
-              <a:defRPr sz="1200" b="0" i="0" u="none" strike="noStrike" cap="none">
+          </a:lstStyle>
+          <a:p>
+            <a:fld id="{5046B780-3E36-4981-AABA-86BCA52AC442}" type="datetimeFigureOut">
+              <a:rPr lang="en-US" smtClean="0"/>
+              <a:t>3/23/2025</a:t>
+            </a:fld>
+            <a:endParaRPr lang="en-US"/>
+          </a:p>
+        </p:txBody>
+      </p:sp>
+      <p:sp>
+        <p:nvSpPr>
+          <p:cNvPr id="5" name="Footer Placeholder 4">
+            <a:extLst>
+              <a:ext uri="{FF2B5EF4-FFF2-40B4-BE49-F238E27FC236}">
+                <a16:creationId xmlns:a16="http://schemas.microsoft.com/office/drawing/2014/main" id="{FE22DA80-51CA-781E-BD98-737620718AEB}"/>
+              </a:ext>
+            </a:extLst>
+          </p:cNvPr>
+          <p:cNvSpPr>
+            <a:spLocks noGrp="1"/>
+          </p:cNvSpPr>
+          <p:nvPr>
+            <p:ph type="ftr" sz="quarter" idx="3"/>
+          </p:nvPr>
+        </p:nvSpPr>
+        <p:spPr>
+          <a:xfrm>
+            <a:off x="3028950" y="4767263"/>
+            <a:ext cx="3086100" cy="273844"/>
+          </a:xfrm>
+          <a:prstGeom prst="rect">
+            <a:avLst/>
+          </a:prstGeom>
+        </p:spPr>
+        <p:txBody>
+          <a:bodyPr vert="horz" lIns="91440" tIns="45720" rIns="91440" bIns="45720" rtlCol="0" anchor="ctr"/>
+          <a:lstStyle>
+            <a:lvl1pPr algn="ctr">
+              <a:defRPr sz="900">
                 <a:solidFill>
-                  <a:srgbClr val="000000"/>
+                  <a:schemeClr val="tx1">
+                    <a:tint val="75000"/>
+                  </a:schemeClr>
                 </a:solidFill>
-                <a:latin typeface="Arial"/>
-                <a:ea typeface="Arial"/>
-                <a:cs typeface="Arial"/>
-                <a:sym typeface="Arial"/>
               </a:defRPr>
-            </a:lvl2pPr>
-            <a:lvl3pPr marL="0" marR="0" lvl="2" indent="0" algn="r" rtl="0">
-              <a:lnSpc>
-                <a:spcPct val="100000"/>
-              </a:lnSpc>
-              <a:spcBef>
-                <a:spcPts val="0"/>
-              </a:spcBef>
-              <a:spcAft>
-                <a:spcPts val="0"/>
-              </a:spcAft>
-              <a:buClr>
-                <a:srgbClr val="000000"/>
-              </a:buClr>
-              <a:buSzPts val="1200"/>
-              <a:buFont typeface="Arial"/>
-              <a:buNone/>
-              <a:defRPr sz="1200" b="0" i="0" u="none" strike="noStrike" cap="none">
+            </a:lvl1pPr>
+          </a:lstStyle>
+          <a:p>
+            <a:endParaRPr lang="en-US"/>
+          </a:p>
+        </p:txBody>
+      </p:sp>
+      <p:sp>
+        <p:nvSpPr>
+          <p:cNvPr id="6" name="Slide Number Placeholder 5">
+            <a:extLst>
+              <a:ext uri="{FF2B5EF4-FFF2-40B4-BE49-F238E27FC236}">
+                <a16:creationId xmlns:a16="http://schemas.microsoft.com/office/drawing/2014/main" id="{E77028FA-BF15-C606-0AF1-DE1709F790A9}"/>
+              </a:ext>
+            </a:extLst>
+          </p:cNvPr>
+          <p:cNvSpPr>
+            <a:spLocks noGrp="1"/>
+          </p:cNvSpPr>
+          <p:nvPr>
+            <p:ph type="sldNum" sz="quarter" idx="4"/>
+          </p:nvPr>
+        </p:nvSpPr>
+        <p:spPr>
+          <a:xfrm>
+            <a:off x="6457950" y="4767263"/>
+            <a:ext cx="2057400" cy="273844"/>
+          </a:xfrm>
+          <a:prstGeom prst="rect">
+            <a:avLst/>
+          </a:prstGeom>
+        </p:spPr>
+        <p:txBody>
+          <a:bodyPr vert="horz" lIns="91440" tIns="45720" rIns="91440" bIns="45720" rtlCol="0" anchor="ctr"/>
+          <a:lstStyle>
+            <a:lvl1pPr algn="r">
+              <a:defRPr sz="900">
                 <a:solidFill>
-                  <a:srgbClr val="000000"/>
+                  <a:schemeClr val="tx1">
+                    <a:tint val="75000"/>
+                  </a:schemeClr>
                 </a:solidFill>
-                <a:latin typeface="Arial"/>
-                <a:ea typeface="Arial"/>
-                <a:cs typeface="Arial"/>
-                <a:sym typeface="Arial"/>
               </a:defRPr>
-            </a:lvl3pPr>
-            <a:lvl4pPr marL="0" marR="0" lvl="3" indent="0" algn="r" rtl="0">
-              <a:lnSpc>
-                <a:spcPct val="100000"/>
-              </a:lnSpc>
-              <a:spcBef>
-                <a:spcPts val="0"/>
-              </a:spcBef>
-              <a:spcAft>
-                <a:spcPts val="0"/>
-              </a:spcAft>
-              <a:buClr>
-                <a:srgbClr val="000000"/>
-              </a:buClr>
-              <a:buSzPts val="1200"/>
-              <a:buFont typeface="Arial"/>
-              <a:buNone/>
-              <a:defRPr sz="1200" b="0" i="0" u="none" strike="noStrike" cap="none">
-                <a:solidFill>
-                  <a:srgbClr val="000000"/>
-                </a:solidFill>
-                <a:latin typeface="Arial"/>
-                <a:ea typeface="Arial"/>
-                <a:cs typeface="Arial"/>
-                <a:sym typeface="Arial"/>
-              </a:defRPr>
-            </a:lvl4pPr>
-            <a:lvl5pPr marL="0" marR="0" lvl="4" indent="0" algn="r" rtl="0">
-              <a:lnSpc>
-                <a:spcPct val="100000"/>
-              </a:lnSpc>
-              <a:spcBef>
-                <a:spcPts val="0"/>
-              </a:spcBef>
-              <a:spcAft>
-                <a:spcPts val="0"/>
-              </a:spcAft>
-              <a:buClr>
-                <a:srgbClr val="000000"/>
-              </a:buClr>
-              <a:buSzPts val="1200"/>
-              <a:buFont typeface="Arial"/>
-              <a:buNone/>
-              <a:defRPr sz="1200" b="0" i="0" u="none" strike="noStrike" cap="none">
-                <a:solidFill>
-                  <a:srgbClr val="000000"/>
-                </a:solidFill>
-                <a:latin typeface="Arial"/>
-                <a:ea typeface="Arial"/>
-                <a:cs typeface="Arial"/>
-                <a:sym typeface="Arial"/>
-              </a:defRPr>
-            </a:lvl5pPr>
-            <a:lvl6pPr marL="0" marR="0" lvl="5" indent="0" algn="r" rtl="0">
-              <a:lnSpc>
-                <a:spcPct val="100000"/>
-              </a:lnSpc>
-              <a:spcBef>
-                <a:spcPts val="0"/>
-              </a:spcBef>
-              <a:spcAft>
-                <a:spcPts val="0"/>
-              </a:spcAft>
-              <a:buClr>
-                <a:srgbClr val="000000"/>
-              </a:buClr>
-              <a:buSzPts val="1200"/>
-              <a:buFont typeface="Arial"/>
-              <a:buNone/>
-              <a:defRPr sz="1200" b="0" i="0" u="none" strike="noStrike" cap="none">
-                <a:solidFill>
-                  <a:srgbClr val="000000"/>
-                </a:solidFill>
-                <a:latin typeface="Arial"/>
-                <a:ea typeface="Arial"/>
-                <a:cs typeface="Arial"/>
-                <a:sym typeface="Arial"/>
-              </a:defRPr>
-            </a:lvl6pPr>
-            <a:lvl7pPr marL="0" marR="0" lvl="6" indent="0" algn="r" rtl="0">
-              <a:lnSpc>
-                <a:spcPct val="100000"/>
-              </a:lnSpc>
-              <a:spcBef>
-                <a:spcPts val="0"/>
-              </a:spcBef>
-              <a:spcAft>
-                <a:spcPts val="0"/>
-              </a:spcAft>
-              <a:buClr>
-                <a:srgbClr val="000000"/>
-              </a:buClr>
-              <a:buSzPts val="1200"/>
-              <a:buFont typeface="Arial"/>
-              <a:buNone/>
-              <a:defRPr sz="1200" b="0" i="0" u="none" strike="noStrike" cap="none">
-                <a:solidFill>
-                  <a:srgbClr val="000000"/>
-                </a:solidFill>
-                <a:latin typeface="Arial"/>
-                <a:ea typeface="Arial"/>
-                <a:cs typeface="Arial"/>
-                <a:sym typeface="Arial"/>
-              </a:defRPr>
-            </a:lvl7pPr>
-            <a:lvl8pPr marL="0" marR="0" lvl="7" indent="0" algn="r" rtl="0">
-              <a:lnSpc>
-                <a:spcPct val="100000"/>
-              </a:lnSpc>
-              <a:spcBef>
-                <a:spcPts val="0"/>
-              </a:spcBef>
-              <a:spcAft>
-                <a:spcPts val="0"/>
-              </a:spcAft>
-              <a:buClr>
-                <a:srgbClr val="000000"/>
-              </a:buClr>
-              <a:buSzPts val="1200"/>
-              <a:buFont typeface="Arial"/>
-              <a:buNone/>
-              <a:defRPr sz="1200" b="0" i="0" u="none" strike="noStrike" cap="none">
-                <a:solidFill>
-                  <a:srgbClr val="000000"/>
-                </a:solidFill>
-                <a:latin typeface="Arial"/>
-                <a:ea typeface="Arial"/>
-                <a:cs typeface="Arial"/>
-                <a:sym typeface="Arial"/>
-              </a:defRPr>
-            </a:lvl8pPr>
-            <a:lvl9pPr marL="0" marR="0" lvl="8" indent="0" algn="r" rtl="0">
-              <a:lnSpc>
-                <a:spcPct val="100000"/>
-              </a:lnSpc>
-              <a:spcBef>
-                <a:spcPts val="0"/>
-              </a:spcBef>
-              <a:spcAft>
-                <a:spcPts val="0"/>
-              </a:spcAft>
-              <a:buClr>
-                <a:srgbClr val="000000"/>
-              </a:buClr>
-              <a:buSzPts val="1200"/>
-              <a:buFont typeface="Arial"/>
-              <a:buNone/>
-              <a:defRPr sz="1200" b="0" i="0" u="none" strike="noStrike" cap="none">
-                <a:solidFill>
-                  <a:srgbClr val="000000"/>
-                </a:solidFill>
-                <a:latin typeface="Arial"/>
-                <a:ea typeface="Arial"/>
-                <a:cs typeface="Arial"/>
-                <a:sym typeface="Arial"/>
-              </a:defRPr>
-            </a:lvl9pPr>
+            </a:lvl1pPr>
           </a:lstStyle>
           <a:p>
             <a:pPr marL="0" lvl="0" indent="0" algn="r" rtl="0">
@@ -7240,708 +6510,303 @@
               <a:buNone/>
             </a:pPr>
             <a:fld id="{00000000-1234-1234-1234-123412341234}" type="slidenum">
-              <a:rPr lang="en"/>
+              <a:rPr lang="en" smtClean="0"/>
               <a:t>‹#›</a:t>
             </a:fld>
-            <a:endParaRPr/>
+            <a:endParaRPr lang="en"/>
           </a:p>
         </p:txBody>
       </p:sp>
     </p:spTree>
+    <p:extLst>
+      <p:ext uri="{BB962C8B-B14F-4D97-AF65-F5344CB8AC3E}">
+        <p14:creationId xmlns:p14="http://schemas.microsoft.com/office/powerpoint/2010/main" val="3257810563"/>
+      </p:ext>
+    </p:extLst>
   </p:cSld>
-  <p:clrMap bg1="lt1" tx1="dk1" bg2="dk2" tx2="lt2" accent1="accent1" accent2="accent2" accent3="accent3" accent4="accent4" accent5="accent5" accent6="accent6" hlink="hlink" folHlink="folHlink"/>
+  <p:clrMap bg1="lt1" tx1="dk1" bg2="lt2" tx2="dk2" accent1="accent1" accent2="accent2" accent3="accent3" accent4="accent4" accent5="accent5" accent6="accent6" hlink="hlink" folHlink="folHlink"/>
   <p:sldLayoutIdLst>
-    <p:sldLayoutId id="2147483663" r:id="rId1"/>
-    <p:sldLayoutId id="2147483667" r:id="rId2"/>
-    <p:sldLayoutId id="2147483668" r:id="rId3"/>
-    <p:sldLayoutId id="2147483669" r:id="rId4"/>
+    <p:sldLayoutId id="2147483682" r:id="rId1"/>
+    <p:sldLayoutId id="2147483683" r:id="rId2"/>
+    <p:sldLayoutId id="2147483684" r:id="rId3"/>
   </p:sldLayoutIdLst>
   <p:hf sldNum="0" hdr="0" ftr="0" dt="0"/>
   <p:txStyles>
     <p:titleStyle>
-      <a:defPPr marR="0" lvl="0" algn="l" rtl="0">
+      <a:lvl1pPr algn="l" defTabSz="685800" rtl="0" eaLnBrk="1" latinLnBrk="0" hangingPunct="1">
         <a:lnSpc>
-          <a:spcPct val="100000"/>
+          <a:spcPct val="90000"/>
         </a:lnSpc>
         <a:spcBef>
-          <a:spcPts val="0"/>
+          <a:spcPct val="0"/>
         </a:spcBef>
-        <a:spcAft>
-          <a:spcPts val="0"/>
-        </a:spcAft>
-      </a:defPPr>
-      <a:lvl1pPr marR="0" lvl="0" algn="l" rtl="0">
+        <a:buNone/>
+        <a:defRPr sz="3300" kern="1200">
+          <a:solidFill>
+            <a:schemeClr val="tx1"/>
+          </a:solidFill>
+          <a:latin typeface="+mj-lt"/>
+          <a:ea typeface="+mj-ea"/>
+          <a:cs typeface="+mj-cs"/>
+        </a:defRPr>
+      </a:lvl1pPr>
+    </p:titleStyle>
+    <p:bodyStyle>
+      <a:lvl1pPr marL="171450" indent="-171450" algn="l" defTabSz="685800" rtl="0" eaLnBrk="1" latinLnBrk="0" hangingPunct="1">
         <a:lnSpc>
-          <a:spcPct val="100000"/>
+          <a:spcPct val="90000"/>
         </a:lnSpc>
         <a:spcBef>
-          <a:spcPts val="0"/>
+          <a:spcPts val="750"/>
         </a:spcBef>
-        <a:spcAft>
-          <a:spcPts val="0"/>
-        </a:spcAft>
-        <a:buClr>
-          <a:srgbClr val="000000"/>
-        </a:buClr>
-        <a:buFont typeface="Arial"/>
-        <a:defRPr sz="1400" b="0" i="0" u="none" strike="noStrike" cap="none">
+        <a:buFont typeface="Arial" panose="020B0604020202020204" pitchFamily="34" charset="0"/>
+        <a:buChar char="•"/>
+        <a:defRPr sz="2100" kern="1200">
           <a:solidFill>
-            <a:srgbClr val="000000"/>
+            <a:schemeClr val="tx1"/>
           </a:solidFill>
-          <a:latin typeface="Arial"/>
-          <a:ea typeface="Arial"/>
-          <a:cs typeface="Arial"/>
-          <a:sym typeface="Arial"/>
+          <a:latin typeface="+mn-lt"/>
+          <a:ea typeface="+mn-ea"/>
+          <a:cs typeface="+mn-cs"/>
         </a:defRPr>
       </a:lvl1pPr>
-      <a:lvl2pPr marR="0" lvl="1" algn="l" rtl="0">
+      <a:lvl2pPr marL="514350" indent="-171450" algn="l" defTabSz="685800" rtl="0" eaLnBrk="1" latinLnBrk="0" hangingPunct="1">
         <a:lnSpc>
-          <a:spcPct val="100000"/>
+          <a:spcPct val="90000"/>
         </a:lnSpc>
         <a:spcBef>
-          <a:spcPts val="0"/>
+          <a:spcPts val="375"/>
         </a:spcBef>
-        <a:spcAft>
-          <a:spcPts val="0"/>
-        </a:spcAft>
-        <a:buClr>
-          <a:srgbClr val="000000"/>
-        </a:buClr>
-        <a:buFont typeface="Arial"/>
-        <a:defRPr sz="1400" b="0" i="0" u="none" strike="noStrike" cap="none">
+        <a:buFont typeface="Arial" panose="020B0604020202020204" pitchFamily="34" charset="0"/>
+        <a:buChar char="•"/>
+        <a:defRPr sz="1800" kern="1200">
           <a:solidFill>
-            <a:srgbClr val="000000"/>
+            <a:schemeClr val="tx1"/>
           </a:solidFill>
-          <a:latin typeface="Arial"/>
-          <a:ea typeface="Arial"/>
-          <a:cs typeface="Arial"/>
-          <a:sym typeface="Arial"/>
+          <a:latin typeface="+mn-lt"/>
+          <a:ea typeface="+mn-ea"/>
+          <a:cs typeface="+mn-cs"/>
         </a:defRPr>
       </a:lvl2pPr>
-      <a:lvl3pPr marR="0" lvl="2" algn="l" rtl="0">
+      <a:lvl3pPr marL="857250" indent="-171450" algn="l" defTabSz="685800" rtl="0" eaLnBrk="1" latinLnBrk="0" hangingPunct="1">
         <a:lnSpc>
-          <a:spcPct val="100000"/>
+          <a:spcPct val="90000"/>
         </a:lnSpc>
         <a:spcBef>
-          <a:spcPts val="0"/>
+          <a:spcPts val="375"/>
         </a:spcBef>
-        <a:spcAft>
-          <a:spcPts val="0"/>
-        </a:spcAft>
-        <a:buClr>
-          <a:srgbClr val="000000"/>
-        </a:buClr>
-        <a:buFont typeface="Arial"/>
-        <a:defRPr sz="1400" b="0" i="0" u="none" strike="noStrike" cap="none">
+        <a:buFont typeface="Arial" panose="020B0604020202020204" pitchFamily="34" charset="0"/>
+        <a:buChar char="•"/>
+        <a:defRPr sz="1500" kern="1200">
           <a:solidFill>
-            <a:srgbClr val="000000"/>
+            <a:schemeClr val="tx1"/>
           </a:solidFill>
-          <a:latin typeface="Arial"/>
-          <a:ea typeface="Arial"/>
-          <a:cs typeface="Arial"/>
-          <a:sym typeface="Arial"/>
+          <a:latin typeface="+mn-lt"/>
+          <a:ea typeface="+mn-ea"/>
+          <a:cs typeface="+mn-cs"/>
         </a:defRPr>
       </a:lvl3pPr>
-      <a:lvl4pPr marR="0" lvl="3" algn="l" rtl="0">
+      <a:lvl4pPr marL="1200150" indent="-171450" algn="l" defTabSz="685800" rtl="0" eaLnBrk="1" latinLnBrk="0" hangingPunct="1">
         <a:lnSpc>
-          <a:spcPct val="100000"/>
+          <a:spcPct val="90000"/>
         </a:lnSpc>
         <a:spcBef>
-          <a:spcPts val="0"/>
+          <a:spcPts val="375"/>
         </a:spcBef>
-        <a:spcAft>
-          <a:spcPts val="0"/>
-        </a:spcAft>
-        <a:buClr>
-          <a:srgbClr val="000000"/>
-        </a:buClr>
-        <a:buFont typeface="Arial"/>
-        <a:defRPr sz="1400" b="0" i="0" u="none" strike="noStrike" cap="none">
+        <a:buFont typeface="Arial" panose="020B0604020202020204" pitchFamily="34" charset="0"/>
+        <a:buChar char="•"/>
+        <a:defRPr sz="1350" kern="1200">
           <a:solidFill>
-            <a:srgbClr val="000000"/>
+            <a:schemeClr val="tx1"/>
           </a:solidFill>
-          <a:latin typeface="Arial"/>
-          <a:ea typeface="Arial"/>
-          <a:cs typeface="Arial"/>
-          <a:sym typeface="Arial"/>
+          <a:latin typeface="+mn-lt"/>
+          <a:ea typeface="+mn-ea"/>
+          <a:cs typeface="+mn-cs"/>
         </a:defRPr>
       </a:lvl4pPr>
-      <a:lvl5pPr marR="0" lvl="4" algn="l" rtl="0">
+      <a:lvl5pPr marL="1543050" indent="-171450" algn="l" defTabSz="685800" rtl="0" eaLnBrk="1" latinLnBrk="0" hangingPunct="1">
         <a:lnSpc>
-          <a:spcPct val="100000"/>
+          <a:spcPct val="90000"/>
         </a:lnSpc>
         <a:spcBef>
-          <a:spcPts val="0"/>
+          <a:spcPts val="375"/>
         </a:spcBef>
-        <a:spcAft>
-          <a:spcPts val="0"/>
-        </a:spcAft>
-        <a:buClr>
-          <a:srgbClr val="000000"/>
-        </a:buClr>
-        <a:buFont typeface="Arial"/>
-        <a:defRPr sz="1400" b="0" i="0" u="none" strike="noStrike" cap="none">
+        <a:buFont typeface="Arial" panose="020B0604020202020204" pitchFamily="34" charset="0"/>
+        <a:buChar char="•"/>
+        <a:defRPr sz="1350" kern="1200">
           <a:solidFill>
-            <a:srgbClr val="000000"/>
+            <a:schemeClr val="tx1"/>
           </a:solidFill>
-          <a:latin typeface="Arial"/>
-          <a:ea typeface="Arial"/>
-          <a:cs typeface="Arial"/>
-          <a:sym typeface="Arial"/>
+          <a:latin typeface="+mn-lt"/>
+          <a:ea typeface="+mn-ea"/>
+          <a:cs typeface="+mn-cs"/>
         </a:defRPr>
       </a:lvl5pPr>
-      <a:lvl6pPr marR="0" lvl="5" algn="l" rtl="0">
+      <a:lvl6pPr marL="1885950" indent="-171450" algn="l" defTabSz="685800" rtl="0" eaLnBrk="1" latinLnBrk="0" hangingPunct="1">
         <a:lnSpc>
-          <a:spcPct val="100000"/>
+          <a:spcPct val="90000"/>
         </a:lnSpc>
         <a:spcBef>
-          <a:spcPts val="0"/>
+          <a:spcPts val="375"/>
         </a:spcBef>
-        <a:spcAft>
-          <a:spcPts val="0"/>
-        </a:spcAft>
-        <a:buClr>
-          <a:srgbClr val="000000"/>
-        </a:buClr>
-        <a:buFont typeface="Arial"/>
-        <a:defRPr sz="1400" b="0" i="0" u="none" strike="noStrike" cap="none">
+        <a:buFont typeface="Arial" panose="020B0604020202020204" pitchFamily="34" charset="0"/>
+        <a:buChar char="•"/>
+        <a:defRPr sz="1350" kern="1200">
           <a:solidFill>
-            <a:srgbClr val="000000"/>
+            <a:schemeClr val="tx1"/>
           </a:solidFill>
-          <a:latin typeface="Arial"/>
-          <a:ea typeface="Arial"/>
-          <a:cs typeface="Arial"/>
-          <a:sym typeface="Arial"/>
+          <a:latin typeface="+mn-lt"/>
+          <a:ea typeface="+mn-ea"/>
+          <a:cs typeface="+mn-cs"/>
         </a:defRPr>
       </a:lvl6pPr>
-      <a:lvl7pPr marR="0" lvl="6" algn="l" rtl="0">
+      <a:lvl7pPr marL="2228850" indent="-171450" algn="l" defTabSz="685800" rtl="0" eaLnBrk="1" latinLnBrk="0" hangingPunct="1">
         <a:lnSpc>
-          <a:spcPct val="100000"/>
+          <a:spcPct val="90000"/>
         </a:lnSpc>
         <a:spcBef>
-          <a:spcPts val="0"/>
+          <a:spcPts val="375"/>
         </a:spcBef>
-        <a:spcAft>
-          <a:spcPts val="0"/>
-        </a:spcAft>
-        <a:buClr>
-          <a:srgbClr val="000000"/>
-        </a:buClr>
-        <a:buFont typeface="Arial"/>
-        <a:defRPr sz="1400" b="0" i="0" u="none" strike="noStrike" cap="none">
+        <a:buFont typeface="Arial" panose="020B0604020202020204" pitchFamily="34" charset="0"/>
+        <a:buChar char="•"/>
+        <a:defRPr sz="1350" kern="1200">
           <a:solidFill>
-            <a:srgbClr val="000000"/>
+            <a:schemeClr val="tx1"/>
           </a:solidFill>
-          <a:latin typeface="Arial"/>
-          <a:ea typeface="Arial"/>
-          <a:cs typeface="Arial"/>
-          <a:sym typeface="Arial"/>
+          <a:latin typeface="+mn-lt"/>
+          <a:ea typeface="+mn-ea"/>
+          <a:cs typeface="+mn-cs"/>
         </a:defRPr>
       </a:lvl7pPr>
-      <a:lvl8pPr marR="0" lvl="7" algn="l" rtl="0">
+      <a:lvl8pPr marL="2571750" indent="-171450" algn="l" defTabSz="685800" rtl="0" eaLnBrk="1" latinLnBrk="0" hangingPunct="1">
         <a:lnSpc>
-          <a:spcPct val="100000"/>
+          <a:spcPct val="90000"/>
         </a:lnSpc>
         <a:spcBef>
-          <a:spcPts val="0"/>
+          <a:spcPts val="375"/>
         </a:spcBef>
-        <a:spcAft>
-          <a:spcPts val="0"/>
-        </a:spcAft>
-        <a:buClr>
-          <a:srgbClr val="000000"/>
-        </a:buClr>
-        <a:buFont typeface="Arial"/>
-        <a:defRPr sz="1400" b="0" i="0" u="none" strike="noStrike" cap="none">
+        <a:buFont typeface="Arial" panose="020B0604020202020204" pitchFamily="34" charset="0"/>
+        <a:buChar char="•"/>
+        <a:defRPr sz="1350" kern="1200">
           <a:solidFill>
-            <a:srgbClr val="000000"/>
+            <a:schemeClr val="tx1"/>
           </a:solidFill>
-          <a:latin typeface="Arial"/>
-          <a:ea typeface="Arial"/>
-          <a:cs typeface="Arial"/>
-          <a:sym typeface="Arial"/>
+          <a:latin typeface="+mn-lt"/>
+          <a:ea typeface="+mn-ea"/>
+          <a:cs typeface="+mn-cs"/>
         </a:defRPr>
       </a:lvl8pPr>
-      <a:lvl9pPr marR="0" lvl="8" algn="l" rtl="0">
+      <a:lvl9pPr marL="2914650" indent="-171450" algn="l" defTabSz="685800" rtl="0" eaLnBrk="1" latinLnBrk="0" hangingPunct="1">
         <a:lnSpc>
-          <a:spcPct val="100000"/>
+          <a:spcPct val="90000"/>
         </a:lnSpc>
         <a:spcBef>
-          <a:spcPts val="0"/>
+          <a:spcPts val="375"/>
         </a:spcBef>
-        <a:spcAft>
-          <a:spcPts val="0"/>
-        </a:spcAft>
-        <a:buClr>
-          <a:srgbClr val="000000"/>
-        </a:buClr>
-        <a:buFont typeface="Arial"/>
-        <a:defRPr sz="1400" b="0" i="0" u="none" strike="noStrike" cap="none">
+        <a:buFont typeface="Arial" panose="020B0604020202020204" pitchFamily="34" charset="0"/>
+        <a:buChar char="•"/>
+        <a:defRPr sz="1350" kern="1200">
           <a:solidFill>
-            <a:srgbClr val="000000"/>
+            <a:schemeClr val="tx1"/>
           </a:solidFill>
-          <a:latin typeface="Arial"/>
-          <a:ea typeface="Arial"/>
-          <a:cs typeface="Arial"/>
-          <a:sym typeface="Arial"/>
-        </a:defRPr>
-      </a:lvl9pPr>
-    </p:titleStyle>
-    <p:bodyStyle>
-      <a:defPPr marR="0" lvl="0" algn="l" rtl="0">
-        <a:lnSpc>
-          <a:spcPct val="100000"/>
-        </a:lnSpc>
-        <a:spcBef>
-          <a:spcPts val="0"/>
-        </a:spcBef>
-        <a:spcAft>
-          <a:spcPts val="0"/>
-        </a:spcAft>
-      </a:defPPr>
-      <a:lvl1pPr marR="0" lvl="0" algn="l" rtl="0">
-        <a:lnSpc>
-          <a:spcPct val="100000"/>
-        </a:lnSpc>
-        <a:spcBef>
-          <a:spcPts val="0"/>
-        </a:spcBef>
-        <a:spcAft>
-          <a:spcPts val="0"/>
-        </a:spcAft>
-        <a:buClr>
-          <a:srgbClr val="000000"/>
-        </a:buClr>
-        <a:buFont typeface="Arial"/>
-        <a:defRPr sz="1400" b="0" i="0" u="none" strike="noStrike" cap="none">
-          <a:solidFill>
-            <a:srgbClr val="000000"/>
-          </a:solidFill>
-          <a:latin typeface="Arial"/>
-          <a:ea typeface="Arial"/>
-          <a:cs typeface="Arial"/>
-          <a:sym typeface="Arial"/>
-        </a:defRPr>
-      </a:lvl1pPr>
-      <a:lvl2pPr marR="0" lvl="1" algn="l" rtl="0">
-        <a:lnSpc>
-          <a:spcPct val="100000"/>
-        </a:lnSpc>
-        <a:spcBef>
-          <a:spcPts val="0"/>
-        </a:spcBef>
-        <a:spcAft>
-          <a:spcPts val="0"/>
-        </a:spcAft>
-        <a:buClr>
-          <a:srgbClr val="000000"/>
-        </a:buClr>
-        <a:buFont typeface="Arial"/>
-        <a:defRPr sz="1400" b="0" i="0" u="none" strike="noStrike" cap="none">
-          <a:solidFill>
-            <a:srgbClr val="000000"/>
-          </a:solidFill>
-          <a:latin typeface="Arial"/>
-          <a:ea typeface="Arial"/>
-          <a:cs typeface="Arial"/>
-          <a:sym typeface="Arial"/>
-        </a:defRPr>
-      </a:lvl2pPr>
-      <a:lvl3pPr marR="0" lvl="2" algn="l" rtl="0">
-        <a:lnSpc>
-          <a:spcPct val="100000"/>
-        </a:lnSpc>
-        <a:spcBef>
-          <a:spcPts val="0"/>
-        </a:spcBef>
-        <a:spcAft>
-          <a:spcPts val="0"/>
-        </a:spcAft>
-        <a:buClr>
-          <a:srgbClr val="000000"/>
-        </a:buClr>
-        <a:buFont typeface="Arial"/>
-        <a:defRPr sz="1400" b="0" i="0" u="none" strike="noStrike" cap="none">
-          <a:solidFill>
-            <a:srgbClr val="000000"/>
-          </a:solidFill>
-          <a:latin typeface="Arial"/>
-          <a:ea typeface="Arial"/>
-          <a:cs typeface="Arial"/>
-          <a:sym typeface="Arial"/>
-        </a:defRPr>
-      </a:lvl3pPr>
-      <a:lvl4pPr marR="0" lvl="3" algn="l" rtl="0">
-        <a:lnSpc>
-          <a:spcPct val="100000"/>
-        </a:lnSpc>
-        <a:spcBef>
-          <a:spcPts val="0"/>
-        </a:spcBef>
-        <a:spcAft>
-          <a:spcPts val="0"/>
-        </a:spcAft>
-        <a:buClr>
-          <a:srgbClr val="000000"/>
-        </a:buClr>
-        <a:buFont typeface="Arial"/>
-        <a:defRPr sz="1400" b="0" i="0" u="none" strike="noStrike" cap="none">
-          <a:solidFill>
-            <a:srgbClr val="000000"/>
-          </a:solidFill>
-          <a:latin typeface="Arial"/>
-          <a:ea typeface="Arial"/>
-          <a:cs typeface="Arial"/>
-          <a:sym typeface="Arial"/>
-        </a:defRPr>
-      </a:lvl4pPr>
-      <a:lvl5pPr marR="0" lvl="4" algn="l" rtl="0">
-        <a:lnSpc>
-          <a:spcPct val="100000"/>
-        </a:lnSpc>
-        <a:spcBef>
-          <a:spcPts val="0"/>
-        </a:spcBef>
-        <a:spcAft>
-          <a:spcPts val="0"/>
-        </a:spcAft>
-        <a:buClr>
-          <a:srgbClr val="000000"/>
-        </a:buClr>
-        <a:buFont typeface="Arial"/>
-        <a:defRPr sz="1400" b="0" i="0" u="none" strike="noStrike" cap="none">
-          <a:solidFill>
-            <a:srgbClr val="000000"/>
-          </a:solidFill>
-          <a:latin typeface="Arial"/>
-          <a:ea typeface="Arial"/>
-          <a:cs typeface="Arial"/>
-          <a:sym typeface="Arial"/>
-        </a:defRPr>
-      </a:lvl5pPr>
-      <a:lvl6pPr marR="0" lvl="5" algn="l" rtl="0">
-        <a:lnSpc>
-          <a:spcPct val="100000"/>
-        </a:lnSpc>
-        <a:spcBef>
-          <a:spcPts val="0"/>
-        </a:spcBef>
-        <a:spcAft>
-          <a:spcPts val="0"/>
-        </a:spcAft>
-        <a:buClr>
-          <a:srgbClr val="000000"/>
-        </a:buClr>
-        <a:buFont typeface="Arial"/>
-        <a:defRPr sz="1400" b="0" i="0" u="none" strike="noStrike" cap="none">
-          <a:solidFill>
-            <a:srgbClr val="000000"/>
-          </a:solidFill>
-          <a:latin typeface="Arial"/>
-          <a:ea typeface="Arial"/>
-          <a:cs typeface="Arial"/>
-          <a:sym typeface="Arial"/>
-        </a:defRPr>
-      </a:lvl6pPr>
-      <a:lvl7pPr marR="0" lvl="6" algn="l" rtl="0">
-        <a:lnSpc>
-          <a:spcPct val="100000"/>
-        </a:lnSpc>
-        <a:spcBef>
-          <a:spcPts val="0"/>
-        </a:spcBef>
-        <a:spcAft>
-          <a:spcPts val="0"/>
-        </a:spcAft>
-        <a:buClr>
-          <a:srgbClr val="000000"/>
-        </a:buClr>
-        <a:buFont typeface="Arial"/>
-        <a:defRPr sz="1400" b="0" i="0" u="none" strike="noStrike" cap="none">
-          <a:solidFill>
-            <a:srgbClr val="000000"/>
-          </a:solidFill>
-          <a:latin typeface="Arial"/>
-          <a:ea typeface="Arial"/>
-          <a:cs typeface="Arial"/>
-          <a:sym typeface="Arial"/>
-        </a:defRPr>
-      </a:lvl7pPr>
-      <a:lvl8pPr marR="0" lvl="7" algn="l" rtl="0">
-        <a:lnSpc>
-          <a:spcPct val="100000"/>
-        </a:lnSpc>
-        <a:spcBef>
-          <a:spcPts val="0"/>
-        </a:spcBef>
-        <a:spcAft>
-          <a:spcPts val="0"/>
-        </a:spcAft>
-        <a:buClr>
-          <a:srgbClr val="000000"/>
-        </a:buClr>
-        <a:buFont typeface="Arial"/>
-        <a:defRPr sz="1400" b="0" i="0" u="none" strike="noStrike" cap="none">
-          <a:solidFill>
-            <a:srgbClr val="000000"/>
-          </a:solidFill>
-          <a:latin typeface="Arial"/>
-          <a:ea typeface="Arial"/>
-          <a:cs typeface="Arial"/>
-          <a:sym typeface="Arial"/>
-        </a:defRPr>
-      </a:lvl8pPr>
-      <a:lvl9pPr marR="0" lvl="8" algn="l" rtl="0">
-        <a:lnSpc>
-          <a:spcPct val="100000"/>
-        </a:lnSpc>
-        <a:spcBef>
-          <a:spcPts val="0"/>
-        </a:spcBef>
-        <a:spcAft>
-          <a:spcPts val="0"/>
-        </a:spcAft>
-        <a:buClr>
-          <a:srgbClr val="000000"/>
-        </a:buClr>
-        <a:buFont typeface="Arial"/>
-        <a:defRPr sz="1400" b="0" i="0" u="none" strike="noStrike" cap="none">
-          <a:solidFill>
-            <a:srgbClr val="000000"/>
-          </a:solidFill>
-          <a:latin typeface="Arial"/>
-          <a:ea typeface="Arial"/>
-          <a:cs typeface="Arial"/>
-          <a:sym typeface="Arial"/>
+          <a:latin typeface="+mn-lt"/>
+          <a:ea typeface="+mn-ea"/>
+          <a:cs typeface="+mn-cs"/>
         </a:defRPr>
       </a:lvl9pPr>
     </p:bodyStyle>
     <p:otherStyle>
-      <a:defPPr marR="0" lvl="0" algn="l" rtl="0">
-        <a:lnSpc>
-          <a:spcPct val="100000"/>
-        </a:lnSpc>
-        <a:spcBef>
-          <a:spcPts val="0"/>
-        </a:spcBef>
-        <a:spcAft>
-          <a:spcPts val="0"/>
-        </a:spcAft>
+      <a:defPPr>
+        <a:defRPr lang="en-US"/>
       </a:defPPr>
-      <a:lvl1pPr marR="0" lvl="0" algn="l" rtl="0">
-        <a:lnSpc>
-          <a:spcPct val="100000"/>
-        </a:lnSpc>
-        <a:spcBef>
-          <a:spcPts val="0"/>
-        </a:spcBef>
-        <a:spcAft>
-          <a:spcPts val="0"/>
-        </a:spcAft>
-        <a:buClr>
-          <a:srgbClr val="000000"/>
-        </a:buClr>
-        <a:buFont typeface="Arial"/>
-        <a:defRPr sz="1400" b="0" i="0" u="none" strike="noStrike" cap="none">
+      <a:lvl1pPr marL="0" algn="l" defTabSz="685800" rtl="0" eaLnBrk="1" latinLnBrk="0" hangingPunct="1">
+        <a:defRPr sz="1350" kern="1200">
           <a:solidFill>
-            <a:srgbClr val="000000"/>
+            <a:schemeClr val="tx1"/>
           </a:solidFill>
-          <a:latin typeface="Arial"/>
-          <a:ea typeface="Arial"/>
-          <a:cs typeface="Arial"/>
-          <a:sym typeface="Arial"/>
+          <a:latin typeface="+mn-lt"/>
+          <a:ea typeface="+mn-ea"/>
+          <a:cs typeface="+mn-cs"/>
         </a:defRPr>
       </a:lvl1pPr>
-      <a:lvl2pPr marR="0" lvl="1" algn="l" rtl="0">
-        <a:lnSpc>
-          <a:spcPct val="100000"/>
-        </a:lnSpc>
-        <a:spcBef>
-          <a:spcPts val="0"/>
-        </a:spcBef>
-        <a:spcAft>
-          <a:spcPts val="0"/>
-        </a:spcAft>
-        <a:buClr>
-          <a:srgbClr val="000000"/>
-        </a:buClr>
-        <a:buFont typeface="Arial"/>
-        <a:defRPr sz="1400" b="0" i="0" u="none" strike="noStrike" cap="none">
+      <a:lvl2pPr marL="342900" algn="l" defTabSz="685800" rtl="0" eaLnBrk="1" latinLnBrk="0" hangingPunct="1">
+        <a:defRPr sz="1350" kern="1200">
           <a:solidFill>
-            <a:srgbClr val="000000"/>
+            <a:schemeClr val="tx1"/>
           </a:solidFill>
-          <a:latin typeface="Arial"/>
-          <a:ea typeface="Arial"/>
-          <a:cs typeface="Arial"/>
-          <a:sym typeface="Arial"/>
+          <a:latin typeface="+mn-lt"/>
+          <a:ea typeface="+mn-ea"/>
+          <a:cs typeface="+mn-cs"/>
         </a:defRPr>
       </a:lvl2pPr>
-      <a:lvl3pPr marR="0" lvl="2" algn="l" rtl="0">
-        <a:lnSpc>
-          <a:spcPct val="100000"/>
-        </a:lnSpc>
-        <a:spcBef>
-          <a:spcPts val="0"/>
-        </a:spcBef>
-        <a:spcAft>
-          <a:spcPts val="0"/>
-        </a:spcAft>
-        <a:buClr>
-          <a:srgbClr val="000000"/>
-        </a:buClr>
-        <a:buFont typeface="Arial"/>
-        <a:defRPr sz="1400" b="0" i="0" u="none" strike="noStrike" cap="none">
+      <a:lvl3pPr marL="685800" algn="l" defTabSz="685800" rtl="0" eaLnBrk="1" latinLnBrk="0" hangingPunct="1">
+        <a:defRPr sz="1350" kern="1200">
           <a:solidFill>
-            <a:srgbClr val="000000"/>
+            <a:schemeClr val="tx1"/>
           </a:solidFill>
-          <a:latin typeface="Arial"/>
-          <a:ea typeface="Arial"/>
-          <a:cs typeface="Arial"/>
-          <a:sym typeface="Arial"/>
+          <a:latin typeface="+mn-lt"/>
+          <a:ea typeface="+mn-ea"/>
+          <a:cs typeface="+mn-cs"/>
         </a:defRPr>
       </a:lvl3pPr>
-      <a:lvl4pPr marR="0" lvl="3" algn="l" rtl="0">
-        <a:lnSpc>
-          <a:spcPct val="100000"/>
-        </a:lnSpc>
-        <a:spcBef>
-          <a:spcPts val="0"/>
-        </a:spcBef>
-        <a:spcAft>
-          <a:spcPts val="0"/>
-        </a:spcAft>
-        <a:buClr>
-          <a:srgbClr val="000000"/>
-        </a:buClr>
-        <a:buFont typeface="Arial"/>
-        <a:defRPr sz="1400" b="0" i="0" u="none" strike="noStrike" cap="none">
+      <a:lvl4pPr marL="1028700" algn="l" defTabSz="685800" rtl="0" eaLnBrk="1" latinLnBrk="0" hangingPunct="1">
+        <a:defRPr sz="1350" kern="1200">
           <a:solidFill>
-            <a:srgbClr val="000000"/>
+            <a:schemeClr val="tx1"/>
           </a:solidFill>
-          <a:latin typeface="Arial"/>
-          <a:ea typeface="Arial"/>
-          <a:cs typeface="Arial"/>
-          <a:sym typeface="Arial"/>
+          <a:latin typeface="+mn-lt"/>
+          <a:ea typeface="+mn-ea"/>
+          <a:cs typeface="+mn-cs"/>
         </a:defRPr>
       </a:lvl4pPr>
-      <a:lvl5pPr marR="0" lvl="4" algn="l" rtl="0">
-        <a:lnSpc>
-          <a:spcPct val="100000"/>
-        </a:lnSpc>
-        <a:spcBef>
-          <a:spcPts val="0"/>
-        </a:spcBef>
-        <a:spcAft>
-          <a:spcPts val="0"/>
-        </a:spcAft>
-        <a:buClr>
-          <a:srgbClr val="000000"/>
-        </a:buClr>
-        <a:buFont typeface="Arial"/>
-        <a:defRPr sz="1400" b="0" i="0" u="none" strike="noStrike" cap="none">
+      <a:lvl5pPr marL="1371600" algn="l" defTabSz="685800" rtl="0" eaLnBrk="1" latinLnBrk="0" hangingPunct="1">
+        <a:defRPr sz="1350" kern="1200">
           <a:solidFill>
-            <a:srgbClr val="000000"/>
+            <a:schemeClr val="tx1"/>
           </a:solidFill>
-          <a:latin typeface="Arial"/>
-          <a:ea typeface="Arial"/>
-          <a:cs typeface="Arial"/>
-          <a:sym typeface="Arial"/>
+          <a:latin typeface="+mn-lt"/>
+          <a:ea typeface="+mn-ea"/>
+          <a:cs typeface="+mn-cs"/>
         </a:defRPr>
       </a:lvl5pPr>
-      <a:lvl6pPr marR="0" lvl="5" algn="l" rtl="0">
-        <a:lnSpc>
-          <a:spcPct val="100000"/>
-        </a:lnSpc>
-        <a:spcBef>
-          <a:spcPts val="0"/>
-        </a:spcBef>
-        <a:spcAft>
-          <a:spcPts val="0"/>
-        </a:spcAft>
-        <a:buClr>
-          <a:srgbClr val="000000"/>
-        </a:buClr>
-        <a:buFont typeface="Arial"/>
-        <a:defRPr sz="1400" b="0" i="0" u="none" strike="noStrike" cap="none">
+      <a:lvl6pPr marL="1714500" algn="l" defTabSz="685800" rtl="0" eaLnBrk="1" latinLnBrk="0" hangingPunct="1">
+        <a:defRPr sz="1350" kern="1200">
           <a:solidFill>
-            <a:srgbClr val="000000"/>
+            <a:schemeClr val="tx1"/>
           </a:solidFill>
-          <a:latin typeface="Arial"/>
-          <a:ea typeface="Arial"/>
-          <a:cs typeface="Arial"/>
-          <a:sym typeface="Arial"/>
+          <a:latin typeface="+mn-lt"/>
+          <a:ea typeface="+mn-ea"/>
+          <a:cs typeface="+mn-cs"/>
         </a:defRPr>
       </a:lvl6pPr>
-      <a:lvl7pPr marR="0" lvl="6" algn="l" rtl="0">
-        <a:lnSpc>
-          <a:spcPct val="100000"/>
-        </a:lnSpc>
-        <a:spcBef>
-          <a:spcPts val="0"/>
-        </a:spcBef>
-        <a:spcAft>
-          <a:spcPts val="0"/>
-        </a:spcAft>
-        <a:buClr>
-          <a:srgbClr val="000000"/>
-        </a:buClr>
-        <a:buFont typeface="Arial"/>
-        <a:defRPr sz="1400" b="0" i="0" u="none" strike="noStrike" cap="none">
+      <a:lvl7pPr marL="2057400" algn="l" defTabSz="685800" rtl="0" eaLnBrk="1" latinLnBrk="0" hangingPunct="1">
+        <a:defRPr sz="1350" kern="1200">
           <a:solidFill>
-            <a:srgbClr val="000000"/>
+            <a:schemeClr val="tx1"/>
           </a:solidFill>
-          <a:latin typeface="Arial"/>
-          <a:ea typeface="Arial"/>
-          <a:cs typeface="Arial"/>
-          <a:sym typeface="Arial"/>
+          <a:latin typeface="+mn-lt"/>
+          <a:ea typeface="+mn-ea"/>
+          <a:cs typeface="+mn-cs"/>
         </a:defRPr>
       </a:lvl7pPr>
-      <a:lvl8pPr marR="0" lvl="7" algn="l" rtl="0">
-        <a:lnSpc>
-          <a:spcPct val="100000"/>
-        </a:lnSpc>
-        <a:spcBef>
-          <a:spcPts val="0"/>
-        </a:spcBef>
-        <a:spcAft>
-          <a:spcPts val="0"/>
-        </a:spcAft>
-        <a:buClr>
-          <a:srgbClr val="000000"/>
-        </a:buClr>
-        <a:buFont typeface="Arial"/>
-        <a:defRPr sz="1400" b="0" i="0" u="none" strike="noStrike" cap="none">
+      <a:lvl8pPr marL="2400300" algn="l" defTabSz="685800" rtl="0" eaLnBrk="1" latinLnBrk="0" hangingPunct="1">
+        <a:defRPr sz="1350" kern="1200">
           <a:solidFill>
-            <a:srgbClr val="000000"/>
+            <a:schemeClr val="tx1"/>
           </a:solidFill>
-          <a:latin typeface="Arial"/>
-          <a:ea typeface="Arial"/>
-          <a:cs typeface="Arial"/>
-          <a:sym typeface="Arial"/>
+          <a:latin typeface="+mn-lt"/>
+          <a:ea typeface="+mn-ea"/>
+          <a:cs typeface="+mn-cs"/>
         </a:defRPr>
       </a:lvl8pPr>
-      <a:lvl9pPr marR="0" lvl="8" algn="l" rtl="0">
-        <a:lnSpc>
-          <a:spcPct val="100000"/>
-        </a:lnSpc>
-        <a:spcBef>
-          <a:spcPts val="0"/>
-        </a:spcBef>
-        <a:spcAft>
-          <a:spcPts val="0"/>
-        </a:spcAft>
-        <a:buClr>
-          <a:srgbClr val="000000"/>
-        </a:buClr>
-        <a:buFont typeface="Arial"/>
-        <a:defRPr sz="1400" b="0" i="0" u="none" strike="noStrike" cap="none">
+      <a:lvl9pPr marL="2743200" algn="l" defTabSz="685800" rtl="0" eaLnBrk="1" latinLnBrk="0" hangingPunct="1">
+        <a:defRPr sz="1350" kern="1200">
           <a:solidFill>
-            <a:srgbClr val="000000"/>
+            <a:schemeClr val="tx1"/>
           </a:solidFill>
-          <a:latin typeface="Arial"/>
-          <a:ea typeface="Arial"/>
-          <a:cs typeface="Arial"/>
-          <a:sym typeface="Arial"/>
+          <a:latin typeface="+mn-lt"/>
+          <a:ea typeface="+mn-ea"/>
+          <a:cs typeface="+mn-cs"/>
         </a:defRPr>
       </a:lvl9pPr>
     </p:otherStyle>
@@ -8203,10 +7068,6 @@
           </p:nvPr>
         </p:nvSpPr>
         <p:spPr>
-          <a:xfrm>
-            <a:off x="457198" y="398044"/>
-            <a:ext cx="8289236" cy="609601"/>
-          </a:xfrm>
           <a:prstGeom prst="rect">
             <a:avLst/>
           </a:prstGeom>
@@ -8257,10 +7118,6 @@
           </p:nvPr>
         </p:nvSpPr>
         <p:spPr>
-          <a:xfrm>
-            <a:off x="457198" y="1143000"/>
-            <a:ext cx="8289237" cy="2419398"/>
-          </a:xfrm>
           <a:prstGeom prst="rect">
             <a:avLst/>
           </a:prstGeom>
@@ -8336,10 +7193,6 @@
           </p:nvPr>
         </p:nvSpPr>
         <p:spPr>
-          <a:xfrm>
-            <a:off x="457198" y="398044"/>
-            <a:ext cx="8289236" cy="609601"/>
-          </a:xfrm>
           <a:prstGeom prst="rect">
             <a:avLst/>
           </a:prstGeom>
@@ -8390,10 +7243,6 @@
           </p:nvPr>
         </p:nvSpPr>
         <p:spPr>
-          <a:xfrm>
-            <a:off x="457198" y="1143000"/>
-            <a:ext cx="8289237" cy="2419398"/>
-          </a:xfrm>
           <a:prstGeom prst="rect">
             <a:avLst/>
           </a:prstGeom>
@@ -8552,10 +7401,6 @@
           </p:nvPr>
         </p:nvSpPr>
         <p:spPr>
-          <a:xfrm>
-            <a:off x="457198" y="398044"/>
-            <a:ext cx="8289236" cy="609601"/>
-          </a:xfrm>
           <a:prstGeom prst="rect">
             <a:avLst/>
           </a:prstGeom>
@@ -8606,10 +7451,6 @@
           </p:nvPr>
         </p:nvSpPr>
         <p:spPr>
-          <a:xfrm>
-            <a:off x="457198" y="1143000"/>
-            <a:ext cx="8289237" cy="2419398"/>
-          </a:xfrm>
           <a:prstGeom prst="rect">
             <a:avLst/>
           </a:prstGeom>
@@ -8685,10 +7526,6 @@
           </p:nvPr>
         </p:nvSpPr>
         <p:spPr>
-          <a:xfrm>
-            <a:off x="457198" y="398044"/>
-            <a:ext cx="8289236" cy="609601"/>
-          </a:xfrm>
           <a:prstGeom prst="rect">
             <a:avLst/>
           </a:prstGeom>
@@ -8739,10 +7576,6 @@
           </p:nvPr>
         </p:nvSpPr>
         <p:spPr>
-          <a:xfrm>
-            <a:off x="457198" y="1143000"/>
-            <a:ext cx="8289237" cy="2419398"/>
-          </a:xfrm>
           <a:prstGeom prst="rect">
             <a:avLst/>
           </a:prstGeom>
@@ -8901,10 +7734,6 @@
           </p:nvPr>
         </p:nvSpPr>
         <p:spPr>
-          <a:xfrm>
-            <a:off x="457198" y="398044"/>
-            <a:ext cx="8289236" cy="609601"/>
-          </a:xfrm>
           <a:prstGeom prst="rect">
             <a:avLst/>
           </a:prstGeom>
@@ -8955,10 +7784,6 @@
           </p:nvPr>
         </p:nvSpPr>
         <p:spPr>
-          <a:xfrm>
-            <a:off x="457198" y="1143000"/>
-            <a:ext cx="8289237" cy="2419398"/>
-          </a:xfrm>
           <a:prstGeom prst="rect">
             <a:avLst/>
           </a:prstGeom>
@@ -9034,10 +7859,6 @@
           </p:nvPr>
         </p:nvSpPr>
         <p:spPr>
-          <a:xfrm>
-            <a:off x="457198" y="398044"/>
-            <a:ext cx="8289236" cy="609601"/>
-          </a:xfrm>
           <a:prstGeom prst="rect">
             <a:avLst/>
           </a:prstGeom>
@@ -9088,10 +7909,6 @@
           </p:nvPr>
         </p:nvSpPr>
         <p:spPr>
-          <a:xfrm>
-            <a:off x="457198" y="1143000"/>
-            <a:ext cx="8289237" cy="2419398"/>
-          </a:xfrm>
           <a:prstGeom prst="rect">
             <a:avLst/>
           </a:prstGeom>
@@ -9337,12 +8154,9 @@
         </p:nvSpPr>
         <p:spPr>
           <a:xfrm>
-            <a:off x="341610" y="2244587"/>
-            <a:ext cx="8460779" cy="654326"/>
+            <a:off x="341611" y="1011929"/>
+            <a:ext cx="8460778" cy="654326"/>
           </a:xfrm>
-          <a:prstGeom prst="rect">
-            <a:avLst/>
-          </a:prstGeom>
           <a:noFill/>
           <a:ln>
             <a:noFill/>
@@ -9354,44 +8168,40 @@
           </a:bodyPr>
           <a:lstStyle/>
           <a:p>
-            <a:pPr marL="0" lvl="0" indent="0" algn="ctr" rtl="0">
-              <a:lnSpc>
-                <a:spcPct val="90000"/>
-              </a:lnSpc>
-              <a:spcBef>
-                <a:spcPts val="0"/>
-              </a:spcBef>
-              <a:spcAft>
-                <a:spcPts val="0"/>
-              </a:spcAft>
-              <a:buClr>
-                <a:srgbClr val="FFFFFF"/>
-              </a:buClr>
-              <a:buSzPts val="3600"/>
-              <a:buFont typeface="Roboto"/>
-              <a:buNone/>
-            </a:pPr>
+            <a:pPr lvl="0"/>
             <a:r>
-              <a:rPr lang="en" sz="3600" b="1" i="0" u="none" strike="noStrike" cap="none">
-                <a:solidFill>
-                  <a:srgbClr val="FFFFFF"/>
-                </a:solidFill>
-                <a:latin typeface="Roboto"/>
-                <a:ea typeface="Roboto"/>
-                <a:cs typeface="Roboto"/>
+              <a:rPr lang="en-US">
                 <a:sym typeface="Roboto"/>
               </a:rPr>
               <a:t>Thank-yous</a:t>
             </a:r>
-            <a:endParaRPr sz="3600" b="1" i="0" u="none" strike="noStrike" cap="none">
-              <a:solidFill>
-                <a:srgbClr val="FFFFFF"/>
-              </a:solidFill>
-              <a:latin typeface="Roboto"/>
-              <a:ea typeface="Roboto"/>
-              <a:cs typeface="Roboto"/>
-              <a:sym typeface="Roboto"/>
-            </a:endParaRPr>
+          </a:p>
+        </p:txBody>
+      </p:sp>
+      <p:sp>
+        <p:nvSpPr>
+          <p:cNvPr id="3" name="Text Placeholder 2">
+            <a:extLst>
+              <a:ext uri="{FF2B5EF4-FFF2-40B4-BE49-F238E27FC236}">
+                <a16:creationId xmlns:a16="http://schemas.microsoft.com/office/drawing/2014/main" id="{05878970-13F9-B011-35BE-440948AA9787}"/>
+              </a:ext>
+            </a:extLst>
+          </p:cNvPr>
+          <p:cNvSpPr>
+            <a:spLocks noGrp="1"/>
+          </p:cNvSpPr>
+          <p:nvPr>
+            <p:ph type="body" idx="1"/>
+          </p:nvPr>
+        </p:nvSpPr>
+        <p:spPr/>
+        <p:txBody>
+          <a:bodyPr>
+            <a:normAutofit fontScale="92500" lnSpcReduction="10000"/>
+          </a:bodyPr>
+          <a:lstStyle/>
+          <a:p>
+            <a:endParaRPr lang="en-US"/>
           </a:p>
         </p:txBody>
       </p:sp>
@@ -9431,10 +8241,6 @@
           </p:nvPr>
         </p:nvSpPr>
         <p:spPr>
-          <a:xfrm>
-            <a:off x="457198" y="398044"/>
-            <a:ext cx="8289236" cy="609601"/>
-          </a:xfrm>
           <a:prstGeom prst="rect">
             <a:avLst/>
           </a:prstGeom>
@@ -9485,10 +8291,6 @@
           </p:nvPr>
         </p:nvSpPr>
         <p:spPr>
-          <a:xfrm>
-            <a:off x="457198" y="1143000"/>
-            <a:ext cx="8289237" cy="2419398"/>
-          </a:xfrm>
           <a:prstGeom prst="rect">
             <a:avLst/>
           </a:prstGeom>
@@ -9564,10 +8366,6 @@
           </p:nvPr>
         </p:nvSpPr>
         <p:spPr>
-          <a:xfrm>
-            <a:off x="457198" y="398044"/>
-            <a:ext cx="8289236" cy="609601"/>
-          </a:xfrm>
           <a:prstGeom prst="rect">
             <a:avLst/>
           </a:prstGeom>
@@ -9618,10 +8416,6 @@
           </p:nvPr>
         </p:nvSpPr>
         <p:spPr>
-          <a:xfrm>
-            <a:off x="457198" y="1143000"/>
-            <a:ext cx="8289237" cy="2419398"/>
-          </a:xfrm>
           <a:prstGeom prst="rect">
             <a:avLst/>
           </a:prstGeom>
@@ -9780,10 +8574,6 @@
           </p:nvPr>
         </p:nvSpPr>
         <p:spPr>
-          <a:xfrm>
-            <a:off x="457198" y="398044"/>
-            <a:ext cx="8289236" cy="609601"/>
-          </a:xfrm>
           <a:prstGeom prst="rect">
             <a:avLst/>
           </a:prstGeom>
@@ -9834,10 +8624,6 @@
           </p:nvPr>
         </p:nvSpPr>
         <p:spPr>
-          <a:xfrm>
-            <a:off x="457198" y="1143000"/>
-            <a:ext cx="8289237" cy="2419398"/>
-          </a:xfrm>
           <a:prstGeom prst="rect">
             <a:avLst/>
           </a:prstGeom>
@@ -9929,10 +8715,6 @@
           </p:nvPr>
         </p:nvSpPr>
         <p:spPr>
-          <a:xfrm>
-            <a:off x="457198" y="398044"/>
-            <a:ext cx="8289236" cy="609601"/>
-          </a:xfrm>
           <a:prstGeom prst="rect">
             <a:avLst/>
           </a:prstGeom>
@@ -9983,10 +8765,6 @@
           </p:nvPr>
         </p:nvSpPr>
         <p:spPr>
-          <a:xfrm>
-            <a:off x="457198" y="1143000"/>
-            <a:ext cx="8289237" cy="2419398"/>
-          </a:xfrm>
           <a:prstGeom prst="rect">
             <a:avLst/>
           </a:prstGeom>
@@ -10151,39 +8929,6 @@
           </a:p>
         </p:txBody>
       </p:sp>
-      <p:pic>
-        <p:nvPicPr>
-          <p:cNvPr id="224" name="Google Shape;224;p42"/>
-          <p:cNvPicPr preferRelativeResize="0"/>
-          <p:nvPr/>
-        </p:nvPicPr>
-        <p:blipFill>
-          <a:blip r:embed="rId3" cstate="print">
-            <a:alphaModFix/>
-            <a:extLst>
-              <a:ext uri="{28A0092B-C50C-407E-A947-70E740481C1C}">
-                <a14:useLocalDpi xmlns:a14="http://schemas.microsoft.com/office/drawing/2010/main"/>
-              </a:ext>
-            </a:extLst>
-          </a:blip>
-          <a:stretch>
-            <a:fillRect/>
-          </a:stretch>
-        </p:blipFill>
-        <p:spPr>
-          <a:xfrm>
-            <a:off x="188650" y="-429825"/>
-            <a:ext cx="2066600" cy="2066600"/>
-          </a:xfrm>
-          <a:prstGeom prst="rect">
-            <a:avLst/>
-          </a:prstGeom>
-          <a:noFill/>
-          <a:ln>
-            <a:noFill/>
-          </a:ln>
-        </p:spPr>
-      </p:pic>
       <p:sp>
         <p:nvSpPr>
           <p:cNvPr id="225" name="Google Shape;225;p42"/>
@@ -10191,13 +8936,13 @@
             <a:spLocks noGrp="1"/>
           </p:cNvSpPr>
           <p:nvPr>
-            <p:ph type="title"/>
+            <p:ph type="title" idx="4294967295"/>
           </p:nvPr>
         </p:nvSpPr>
         <p:spPr>
           <a:xfrm>
-            <a:off x="2255251" y="251850"/>
-            <a:ext cx="6537000" cy="609600"/>
+            <a:off x="2608263" y="252413"/>
+            <a:ext cx="6535737" cy="609600"/>
           </a:xfrm>
           <a:prstGeom prst="rect">
             <a:avLst/>
@@ -10245,13 +8990,13 @@
             <a:spLocks noGrp="1"/>
           </p:cNvSpPr>
           <p:nvPr>
-            <p:ph type="title"/>
+            <p:ph type="title" idx="4294967295"/>
           </p:nvPr>
         </p:nvSpPr>
         <p:spPr>
           <a:xfrm>
-            <a:off x="142500" y="2380300"/>
-            <a:ext cx="8859000" cy="1709100"/>
+            <a:off x="0" y="2379663"/>
+            <a:ext cx="8858250" cy="1709737"/>
           </a:xfrm>
           <a:prstGeom prst="rect">
             <a:avLst/>
@@ -10635,6 +9380,39 @@
           </a:p>
         </p:txBody>
       </p:sp>
+      <p:pic>
+        <p:nvPicPr>
+          <p:cNvPr id="224" name="Google Shape;224;p42"/>
+          <p:cNvPicPr preferRelativeResize="0"/>
+          <p:nvPr/>
+        </p:nvPicPr>
+        <p:blipFill>
+          <a:blip r:embed="rId3" cstate="print">
+            <a:alphaModFix/>
+            <a:extLst>
+              <a:ext uri="{28A0092B-C50C-407E-A947-70E740481C1C}">
+                <a14:useLocalDpi xmlns:a14="http://schemas.microsoft.com/office/drawing/2010/main"/>
+              </a:ext>
+            </a:extLst>
+          </a:blip>
+          <a:stretch>
+            <a:fillRect/>
+          </a:stretch>
+        </p:blipFill>
+        <p:spPr>
+          <a:xfrm>
+            <a:off x="188650" y="-429825"/>
+            <a:ext cx="2066600" cy="2066600"/>
+          </a:xfrm>
+          <a:prstGeom prst="rect">
+            <a:avLst/>
+          </a:prstGeom>
+          <a:noFill/>
+          <a:ln>
+            <a:noFill/>
+          </a:ln>
+        </p:spPr>
+      </p:pic>
       <p:sp>
         <p:nvSpPr>
           <p:cNvPr id="227" name="Google Shape;227;p42"/>
@@ -10729,10 +9507,6 @@
           </p:nvPr>
         </p:nvSpPr>
         <p:spPr>
-          <a:xfrm>
-            <a:off x="457198" y="398044"/>
-            <a:ext cx="8289300" cy="609600"/>
-          </a:xfrm>
           <a:prstGeom prst="rect">
             <a:avLst/>
           </a:prstGeom>
@@ -11305,10 +10079,6 @@
           </p:nvPr>
         </p:nvSpPr>
         <p:spPr>
-          <a:xfrm>
-            <a:off x="457198" y="398044"/>
-            <a:ext cx="8289236" cy="609601"/>
-          </a:xfrm>
           <a:prstGeom prst="rect">
             <a:avLst/>
           </a:prstGeom>
@@ -11359,10 +10129,6 @@
           </p:nvPr>
         </p:nvSpPr>
         <p:spPr>
-          <a:xfrm>
-            <a:off x="457198" y="1143000"/>
-            <a:ext cx="8289237" cy="2419398"/>
-          </a:xfrm>
           <a:prstGeom prst="rect">
             <a:avLst/>
           </a:prstGeom>
@@ -11913,10 +10679,6 @@
           </p:nvPr>
         </p:nvSpPr>
         <p:spPr>
-          <a:xfrm>
-            <a:off x="457198" y="398044"/>
-            <a:ext cx="8289236" cy="609601"/>
-          </a:xfrm>
           <a:prstGeom prst="rect">
             <a:avLst/>
           </a:prstGeom>
@@ -11967,10 +10729,6 @@
           </p:nvPr>
         </p:nvSpPr>
         <p:spPr>
-          <a:xfrm>
-            <a:off x="457198" y="1143000"/>
-            <a:ext cx="8289237" cy="2419398"/>
-          </a:xfrm>
           <a:prstGeom prst="rect">
             <a:avLst/>
           </a:prstGeom>
@@ -12248,10 +11006,6 @@
           </p:nvPr>
         </p:nvSpPr>
         <p:spPr>
-          <a:xfrm>
-            <a:off x="457198" y="398044"/>
-            <a:ext cx="8289236" cy="609601"/>
-          </a:xfrm>
           <a:prstGeom prst="rect">
             <a:avLst/>
           </a:prstGeom>
@@ -12302,10 +11056,6 @@
           </p:nvPr>
         </p:nvSpPr>
         <p:spPr>
-          <a:xfrm>
-            <a:off x="457198" y="1143000"/>
-            <a:ext cx="8289237" cy="2419398"/>
-          </a:xfrm>
           <a:prstGeom prst="rect">
             <a:avLst/>
           </a:prstGeom>
@@ -12397,10 +11147,6 @@
           </p:nvPr>
         </p:nvSpPr>
         <p:spPr>
-          <a:xfrm>
-            <a:off x="457198" y="398044"/>
-            <a:ext cx="8289236" cy="609601"/>
-          </a:xfrm>
           <a:prstGeom prst="rect">
             <a:avLst/>
           </a:prstGeom>
@@ -12451,10 +11197,6 @@
           </p:nvPr>
         </p:nvSpPr>
         <p:spPr>
-          <a:xfrm>
-            <a:off x="457198" y="1143000"/>
-            <a:ext cx="8289237" cy="2419398"/>
-          </a:xfrm>
           <a:prstGeom prst="rect">
             <a:avLst/>
           </a:prstGeom>
@@ -12551,41 +11293,6 @@
           </a:p>
         </p:txBody>
       </p:sp>
-      <p:pic>
-        <p:nvPicPr>
-          <p:cNvPr id="5" name="Picture 4">
-            <a:extLst>
-              <a:ext uri="{FF2B5EF4-FFF2-40B4-BE49-F238E27FC236}">
-                <a16:creationId xmlns:a16="http://schemas.microsoft.com/office/drawing/2014/main" id="{7CE04B72-2BA1-4604-359B-8D5898B010AC}"/>
-              </a:ext>
-            </a:extLst>
-          </p:cNvPr>
-          <p:cNvPicPr>
-            <a:picLocks noChangeAspect="1"/>
-          </p:cNvPicPr>
-          <p:nvPr/>
-        </p:nvPicPr>
-        <p:blipFill>
-          <a:blip r:embed="rId2" cstate="print">
-            <a:extLst>
-              <a:ext uri="{28A0092B-C50C-407E-A947-70E740481C1C}">
-                <a14:useLocalDpi xmlns:a14="http://schemas.microsoft.com/office/drawing/2010/main"/>
-              </a:ext>
-            </a:extLst>
-          </a:blip>
-          <a:srcRect t="7739" b="16247"/>
-          <a:stretch/>
-        </p:blipFill>
-        <p:spPr>
-          <a:xfrm>
-            <a:off x="4721013" y="0"/>
-            <a:ext cx="4422987" cy="4350546"/>
-          </a:xfrm>
-          <a:prstGeom prst="rect">
-            <a:avLst/>
-          </a:prstGeom>
-        </p:spPr>
-      </p:pic>
       <p:sp>
         <p:nvSpPr>
           <p:cNvPr id="3" name="Text Placeholder 2">
@@ -12745,6 +11452,41 @@
           </a:p>
         </p:txBody>
       </p:sp>
+      <p:pic>
+        <p:nvPicPr>
+          <p:cNvPr id="5" name="Picture 4">
+            <a:extLst>
+              <a:ext uri="{FF2B5EF4-FFF2-40B4-BE49-F238E27FC236}">
+                <a16:creationId xmlns:a16="http://schemas.microsoft.com/office/drawing/2014/main" id="{7CE04B72-2BA1-4604-359B-8D5898B010AC}"/>
+              </a:ext>
+            </a:extLst>
+          </p:cNvPr>
+          <p:cNvPicPr>
+            <a:picLocks noChangeAspect="1"/>
+          </p:cNvPicPr>
+          <p:nvPr/>
+        </p:nvPicPr>
+        <p:blipFill>
+          <a:blip r:embed="rId2" cstate="print">
+            <a:extLst>
+              <a:ext uri="{28A0092B-C50C-407E-A947-70E740481C1C}">
+                <a14:useLocalDpi xmlns:a14="http://schemas.microsoft.com/office/drawing/2010/main"/>
+              </a:ext>
+            </a:extLst>
+          </a:blip>
+          <a:srcRect t="7739" b="16247"/>
+          <a:stretch/>
+        </p:blipFill>
+        <p:spPr>
+          <a:xfrm>
+            <a:off x="4721013" y="0"/>
+            <a:ext cx="4422987" cy="4350546"/>
+          </a:xfrm>
+          <a:prstGeom prst="rect">
+            <a:avLst/>
+          </a:prstGeom>
+        </p:spPr>
+      </p:pic>
     </p:spTree>
     <p:extLst>
       <p:ext uri="{BB962C8B-B14F-4D97-AF65-F5344CB8AC3E}">
@@ -12759,54 +11501,54 @@
 </file>
 
 <file path=ppt/theme/theme1.xml><?xml version="1.0" encoding="utf-8"?>
-<a:theme xmlns:a="http://schemas.openxmlformats.org/drawingml/2006/main" name="Essential">
+<a:theme xmlns:a="http://schemas.openxmlformats.org/drawingml/2006/main" name="Office Theme">
   <a:themeElements>
-    <a:clrScheme name="Essential">
+    <a:clrScheme name="Office">
       <a:dk1>
-        <a:srgbClr val="000000"/>
+        <a:sysClr val="windowText" lastClr="000000"/>
       </a:dk1>
       <a:lt1>
-        <a:srgbClr val="FFFFFF"/>
+        <a:sysClr val="window" lastClr="FFFFFF"/>
       </a:lt1>
       <a:dk2>
-        <a:srgbClr val="A7A7A7"/>
+        <a:srgbClr val="44546A"/>
       </a:dk2>
       <a:lt2>
-        <a:srgbClr val="535353"/>
+        <a:srgbClr val="E7E6E6"/>
       </a:lt2>
       <a:accent1>
-        <a:srgbClr val="7A7A7A"/>
+        <a:srgbClr val="4472C4"/>
       </a:accent1>
       <a:accent2>
-        <a:srgbClr val="F5C201"/>
+        <a:srgbClr val="ED7D31"/>
       </a:accent2>
       <a:accent3>
-        <a:srgbClr val="526DB0"/>
+        <a:srgbClr val="A5A5A5"/>
       </a:accent3>
       <a:accent4>
-        <a:srgbClr val="989AAC"/>
+        <a:srgbClr val="FFC000"/>
       </a:accent4>
       <a:accent5>
-        <a:srgbClr val="DC5924"/>
+        <a:srgbClr val="5B9BD5"/>
       </a:accent5>
       <a:accent6>
-        <a:srgbClr val="B4B392"/>
+        <a:srgbClr val="70AD47"/>
       </a:accent6>
       <a:hlink>
-        <a:srgbClr val="0000FF"/>
+        <a:srgbClr val="0563C1"/>
       </a:hlink>
       <a:folHlink>
-        <a:srgbClr val="FF00FF"/>
+        <a:srgbClr val="954F72"/>
       </a:folHlink>
     </a:clrScheme>
     <a:fontScheme name="Office">
       <a:majorFont>
-        <a:latin typeface="Arial"/>
+        <a:latin typeface="Calibri Light" panose="020F0302020204030204"/>
         <a:ea typeface=""/>
         <a:cs typeface=""/>
-        <a:font script="Jpan" typeface="ＭＳ Ｐゴシック"/>
+        <a:font script="Jpan" typeface="游ゴシック Light"/>
         <a:font script="Hang" typeface="맑은 고딕"/>
-        <a:font script="Hans" typeface="宋体"/>
+        <a:font script="Hans" typeface="等线 Light"/>
         <a:font script="Hant" typeface="新細明體"/>
         <a:font script="Arab" typeface="Times New Roman"/>
         <a:font script="Hebr" typeface="Times New Roman"/>
@@ -12834,14 +11576,31 @@
         <a:font script="Viet" typeface="Times New Roman"/>
         <a:font script="Uigh" typeface="Microsoft Uighur"/>
         <a:font script="Geor" typeface="Sylfaen"/>
+        <a:font script="Armn" typeface="Arial"/>
+        <a:font script="Bugi" typeface="Leelawadee UI"/>
+        <a:font script="Bopo" typeface="Microsoft JhengHei"/>
+        <a:font script="Java" typeface="Javanese Text"/>
+        <a:font script="Lisu" typeface="Segoe UI"/>
+        <a:font script="Mymr" typeface="Myanmar Text"/>
+        <a:font script="Nkoo" typeface="Ebrima"/>
+        <a:font script="Olck" typeface="Nirmala UI"/>
+        <a:font script="Osma" typeface="Ebrima"/>
+        <a:font script="Phag" typeface="Phagspa"/>
+        <a:font script="Syrn" typeface="Estrangelo Edessa"/>
+        <a:font script="Syrj" typeface="Estrangelo Edessa"/>
+        <a:font script="Syre" typeface="Estrangelo Edessa"/>
+        <a:font script="Sora" typeface="Nirmala UI"/>
+        <a:font script="Tale" typeface="Microsoft Tai Le"/>
+        <a:font script="Talu" typeface="Microsoft New Tai Lue"/>
+        <a:font script="Tfng" typeface="Ebrima"/>
       </a:majorFont>
       <a:minorFont>
-        <a:latin typeface="Arial"/>
+        <a:latin typeface="Calibri" panose="020F0502020204030204"/>
         <a:ea typeface=""/>
         <a:cs typeface=""/>
-        <a:font script="Jpan" typeface="ＭＳ Ｐゴシック"/>
+        <a:font script="Jpan" typeface="游ゴシック"/>
         <a:font script="Hang" typeface="맑은 고딕"/>
-        <a:font script="Hans" typeface="宋体"/>
+        <a:font script="Hans" typeface="等线"/>
         <a:font script="Hant" typeface="新細明體"/>
         <a:font script="Arab" typeface="Arial"/>
         <a:font script="Hebr" typeface="Arial"/>
@@ -12869,6 +11628,23 @@
         <a:font script="Viet" typeface="Arial"/>
         <a:font script="Uigh" typeface="Microsoft Uighur"/>
         <a:font script="Geor" typeface="Sylfaen"/>
+        <a:font script="Armn" typeface="Arial"/>
+        <a:font script="Bugi" typeface="Leelawadee UI"/>
+        <a:font script="Bopo" typeface="Microsoft JhengHei"/>
+        <a:font script="Java" typeface="Javanese Text"/>
+        <a:font script="Lisu" typeface="Segoe UI"/>
+        <a:font script="Mymr" typeface="Myanmar Text"/>
+        <a:font script="Nkoo" typeface="Ebrima"/>
+        <a:font script="Olck" typeface="Nirmala UI"/>
+        <a:font script="Osma" typeface="Ebrima"/>
+        <a:font script="Phag" typeface="Phagspa"/>
+        <a:font script="Syrn" typeface="Estrangelo Edessa"/>
+        <a:font script="Syrj" typeface="Estrangelo Edessa"/>
+        <a:font script="Syre" typeface="Estrangelo Edessa"/>
+        <a:font script="Sora" typeface="Nirmala UI"/>
+        <a:font script="Tale" typeface="Microsoft Tai Le"/>
+        <a:font script="Talu" typeface="Microsoft New Tai Lue"/>
+        <a:font script="Tfng" typeface="Ebrima"/>
       </a:minorFont>
     </a:fontScheme>
     <a:fmtScheme name="Office">
@@ -12880,162 +11656,142 @@
           <a:gsLst>
             <a:gs pos="0">
               <a:schemeClr val="phClr">
-                <a:tint val="50000"/>
-                <a:satMod val="300000"/>
+                <a:lumMod val="110000"/>
+                <a:satMod val="105000"/>
+                <a:tint val="67000"/>
               </a:schemeClr>
             </a:gs>
-            <a:gs pos="35000">
+            <a:gs pos="50000">
               <a:schemeClr val="phClr">
-                <a:tint val="37000"/>
-                <a:satMod val="300000"/>
+                <a:lumMod val="105000"/>
+                <a:satMod val="103000"/>
+                <a:tint val="73000"/>
               </a:schemeClr>
             </a:gs>
             <a:gs pos="100000">
               <a:schemeClr val="phClr">
-                <a:tint val="15000"/>
-                <a:satMod val="350000"/>
+                <a:lumMod val="105000"/>
+                <a:satMod val="109000"/>
+                <a:tint val="81000"/>
               </a:schemeClr>
             </a:gs>
           </a:gsLst>
-          <a:lin ang="16200000" scaled="1"/>
+          <a:lin ang="5400000" scaled="0"/>
         </a:gradFill>
         <a:gradFill rotWithShape="1">
           <a:gsLst>
             <a:gs pos="0">
               <a:schemeClr val="phClr">
-                <a:tint val="100000"/>
+                <a:satMod val="103000"/>
+                <a:lumMod val="102000"/>
+                <a:tint val="94000"/>
+              </a:schemeClr>
+            </a:gs>
+            <a:gs pos="50000">
+              <a:schemeClr val="phClr">
+                <a:satMod val="110000"/>
+                <a:lumMod val="100000"/>
                 <a:shade val="100000"/>
-                <a:satMod val="130000"/>
               </a:schemeClr>
             </a:gs>
             <a:gs pos="100000">
               <a:schemeClr val="phClr">
-                <a:tint val="50000"/>
-                <a:shade val="100000"/>
-                <a:satMod val="350000"/>
+                <a:lumMod val="99000"/>
+                <a:satMod val="120000"/>
+                <a:shade val="78000"/>
               </a:schemeClr>
             </a:gs>
           </a:gsLst>
-          <a:lin ang="16200000" scaled="0"/>
+          <a:lin ang="5400000" scaled="0"/>
         </a:gradFill>
       </a:fillStyleLst>
       <a:lnStyleLst>
-        <a:ln w="9525" cap="flat" cmpd="sng" algn="ctr">
-          <a:solidFill>
-            <a:schemeClr val="phClr">
-              <a:shade val="95000"/>
-              <a:satMod val="105000"/>
-            </a:schemeClr>
-          </a:solidFill>
-          <a:prstDash val="solid"/>
-        </a:ln>
-        <a:ln w="25400" cap="flat" cmpd="sng" algn="ctr">
+        <a:ln w="6350" cap="flat" cmpd="sng" algn="ctr">
           <a:solidFill>
             <a:schemeClr val="phClr"/>
           </a:solidFill>
           <a:prstDash val="solid"/>
+          <a:miter lim="800000"/>
         </a:ln>
-        <a:ln w="38100" cap="flat" cmpd="sng" algn="ctr">
+        <a:ln w="12700" cap="flat" cmpd="sng" algn="ctr">
           <a:solidFill>
             <a:schemeClr val="phClr"/>
           </a:solidFill>
           <a:prstDash val="solid"/>
+          <a:miter lim="800000"/>
+        </a:ln>
+        <a:ln w="19050" cap="flat" cmpd="sng" algn="ctr">
+          <a:solidFill>
+            <a:schemeClr val="phClr"/>
+          </a:solidFill>
+          <a:prstDash val="solid"/>
+          <a:miter lim="800000"/>
         </a:ln>
       </a:lnStyleLst>
       <a:effectStyleLst>
         <a:effectStyle>
+          <a:effectLst/>
+        </a:effectStyle>
+        <a:effectStyle>
+          <a:effectLst/>
+        </a:effectStyle>
+        <a:effectStyle>
           <a:effectLst>
-            <a:outerShdw blurRad="40000" dist="20000" dir="5400000" rotWithShape="0">
+            <a:outerShdw blurRad="57150" dist="19050" dir="5400000" algn="ctr" rotWithShape="0">
               <a:srgbClr val="000000">
-                <a:alpha val="38000"/>
+                <a:alpha val="63000"/>
               </a:srgbClr>
             </a:outerShdw>
           </a:effectLst>
-        </a:effectStyle>
-        <a:effectStyle>
-          <a:effectLst>
-            <a:outerShdw blurRad="40000" dist="23000" dir="5400000" rotWithShape="0">
-              <a:srgbClr val="000000">
-                <a:alpha val="35000"/>
-              </a:srgbClr>
-            </a:outerShdw>
-          </a:effectLst>
-        </a:effectStyle>
-        <a:effectStyle>
-          <a:effectLst>
-            <a:outerShdw blurRad="40000" dist="23000" dir="5400000" rotWithShape="0">
-              <a:srgbClr val="000000">
-                <a:alpha val="35000"/>
-              </a:srgbClr>
-            </a:outerShdw>
-          </a:effectLst>
-          <a:scene3d>
-            <a:camera prst="orthographicFront">
-              <a:rot lat="0" lon="0" rev="0"/>
-            </a:camera>
-            <a:lightRig rig="threePt" dir="t">
-              <a:rot lat="0" lon="0" rev="1200000"/>
-            </a:lightRig>
-          </a:scene3d>
-          <a:sp3d>
-            <a:bevelT w="63500" h="25400"/>
-          </a:sp3d>
         </a:effectStyle>
       </a:effectStyleLst>
       <a:bgFillStyleLst>
         <a:solidFill>
           <a:schemeClr val="phClr"/>
         </a:solidFill>
+        <a:solidFill>
+          <a:schemeClr val="phClr">
+            <a:tint val="95000"/>
+            <a:satMod val="170000"/>
+          </a:schemeClr>
+        </a:solidFill>
         <a:gradFill rotWithShape="1">
           <a:gsLst>
             <a:gs pos="0">
               <a:schemeClr val="phClr">
-                <a:tint val="40000"/>
-                <a:satMod val="350000"/>
+                <a:tint val="93000"/>
+                <a:satMod val="150000"/>
+                <a:shade val="98000"/>
+                <a:lumMod val="102000"/>
               </a:schemeClr>
             </a:gs>
-            <a:gs pos="40000">
+            <a:gs pos="50000">
               <a:schemeClr val="phClr">
-                <a:tint val="45000"/>
-                <a:shade val="99000"/>
-                <a:satMod val="350000"/>
+                <a:tint val="98000"/>
+                <a:satMod val="130000"/>
+                <a:shade val="90000"/>
+                <a:lumMod val="103000"/>
               </a:schemeClr>
             </a:gs>
             <a:gs pos="100000">
               <a:schemeClr val="phClr">
-                <a:shade val="20000"/>
-                <a:satMod val="255000"/>
+                <a:shade val="63000"/>
+                <a:satMod val="120000"/>
               </a:schemeClr>
             </a:gs>
           </a:gsLst>
-          <a:path path="circle">
-            <a:fillToRect l="50000" t="-80000" r="50000" b="180000"/>
-          </a:path>
-        </a:gradFill>
-        <a:gradFill rotWithShape="1">
-          <a:gsLst>
-            <a:gs pos="0">
-              <a:schemeClr val="phClr">
-                <a:tint val="80000"/>
-                <a:satMod val="300000"/>
-              </a:schemeClr>
-            </a:gs>
-            <a:gs pos="100000">
-              <a:schemeClr val="phClr">
-                <a:shade val="30000"/>
-                <a:satMod val="200000"/>
-              </a:schemeClr>
-            </a:gs>
-          </a:gsLst>
-          <a:path path="circle">
-            <a:fillToRect l="50000" t="50000" r="50000" b="50000"/>
-          </a:path>
+          <a:lin ang="5400000" scaled="0"/>
         </a:gradFill>
       </a:bgFillStyleLst>
     </a:fmtScheme>
   </a:themeElements>
   <a:objectDefaults/>
   <a:extraClrSchemeLst/>
+  <a:extLst>
+    <a:ext uri="{05A4C25C-085E-4340-85A3-A5531E510DB2}">
+      <thm15:themeFamily xmlns:thm15="http://schemas.microsoft.com/office/thememl/2012/main" name="Office Theme" id="{62F939B6-93AF-4DB8-9C6B-D6C7DFDC589F}" vid="{4A3C46E8-61CC-4603-A589-7422A47A8E4A}"/>
+    </a:ext>
+  </a:extLst>
 </a:theme>
 </file>
 

</xml_diff>

<commit_message>
Update project file and add ILLink package
- Added `<PublishTrimmed>` property to `FLLSlides.Api.csproj` to enable code trimming during publishing.
- Included `Microsoft.NET.ILLink.Tasks` package reference (v9.0.3) for improved linking and trimming.
- Modified `Awards Ceremony - Short.pptx` with unspecified changes.
</commit_message>
<xml_diff>
--- a/Api/Templates/Awards Ceremony - Short.pptx
+++ b/Api/Templates/Awards Ceremony - Short.pptx
@@ -174,7 +174,7 @@
   <pc:docChgLst>
     <pc:chgData name="Brady Merkel" userId="077b44faa59125c6" providerId="LiveId" clId="{63497E25-CDA1-4359-BFE0-FE2836652BE1}"/>
     <pc:docChg chg="custSel delSld modSld modMainMaster">
-      <pc:chgData name="Brady Merkel" userId="077b44faa59125c6" providerId="LiveId" clId="{63497E25-CDA1-4359-BFE0-FE2836652BE1}" dt="2025-03-23T23:25:05.978" v="10" actId="27636"/>
+      <pc:chgData name="Brady Merkel" userId="077b44faa59125c6" providerId="LiveId" clId="{63497E25-CDA1-4359-BFE0-FE2836652BE1}" dt="2025-03-23T23:51:44.825" v="13" actId="20577"/>
       <pc:docMkLst>
         <pc:docMk/>
       </pc:docMkLst>
@@ -531,13 +531,13 @@
         </pc:spChg>
       </pc:sldChg>
       <pc:sldChg chg="modSp mod">
-        <pc:chgData name="Brady Merkel" userId="077b44faa59125c6" providerId="LiveId" clId="{63497E25-CDA1-4359-BFE0-FE2836652BE1}" dt="2025-03-23T23:17:38.220" v="1" actId="20577"/>
+        <pc:chgData name="Brady Merkel" userId="077b44faa59125c6" providerId="LiveId" clId="{63497E25-CDA1-4359-BFE0-FE2836652BE1}" dt="2025-03-23T23:51:44.825" v="13" actId="20577"/>
         <pc:sldMkLst>
           <pc:docMk/>
           <pc:sldMk cId="0" sldId="301"/>
         </pc:sldMkLst>
         <pc:spChg chg="mod">
-          <ac:chgData name="Brady Merkel" userId="077b44faa59125c6" providerId="LiveId" clId="{63497E25-CDA1-4359-BFE0-FE2836652BE1}" dt="2025-03-23T23:17:38.220" v="1" actId="20577"/>
+          <ac:chgData name="Brady Merkel" userId="077b44faa59125c6" providerId="LiveId" clId="{63497E25-CDA1-4359-BFE0-FE2836652BE1}" dt="2025-03-23T23:51:44.825" v="13" actId="20577"/>
           <ac:spMkLst>
             <pc:docMk/>
             <pc:sldMk cId="0" sldId="301"/>
@@ -622,7 +622,7 @@
         </pc:sldLayoutChg>
       </pc:sldMasterChg>
       <pc:sldMasterChg chg="modSldLayout">
-        <pc:chgData name="Brady Merkel" userId="077b44faa59125c6" providerId="LiveId" clId="{63497E25-CDA1-4359-BFE0-FE2836652BE1}" dt="2025-03-23T23:24:45.851" v="8" actId="207"/>
+        <pc:chgData name="Brady Merkel" userId="077b44faa59125c6" providerId="LiveId" clId="{63497E25-CDA1-4359-BFE0-FE2836652BE1}" dt="2025-03-23T23:51:13.317" v="12"/>
         <pc:sldMasterMkLst>
           <pc:docMk/>
           <pc:sldMasterMk cId="3257810563" sldId="2147483670"/>
@@ -636,7 +636,7 @@
           </pc:sldLayoutMkLst>
         </pc:sldLayoutChg>
         <pc:sldLayoutChg chg="modSp setBg">
-          <pc:chgData name="Brady Merkel" userId="077b44faa59125c6" providerId="LiveId" clId="{63497E25-CDA1-4359-BFE0-FE2836652BE1}" dt="2025-03-23T23:24:45.851" v="8" actId="207"/>
+          <pc:chgData name="Brady Merkel" userId="077b44faa59125c6" providerId="LiveId" clId="{63497E25-CDA1-4359-BFE0-FE2836652BE1}" dt="2025-03-23T23:51:09.663" v="11"/>
           <pc:sldLayoutMkLst>
             <pc:docMk/>
             <pc:sldMasterMk cId="3257810563" sldId="2147483670"/>
@@ -671,7 +671,7 @@
           </pc:spChg>
         </pc:sldLayoutChg>
         <pc:sldLayoutChg chg="setBg">
-          <pc:chgData name="Brady Merkel" userId="077b44faa59125c6" providerId="LiveId" clId="{63497E25-CDA1-4359-BFE0-FE2836652BE1}" dt="2025-03-23T23:24:25.124" v="7"/>
+          <pc:chgData name="Brady Merkel" userId="077b44faa59125c6" providerId="LiveId" clId="{63497E25-CDA1-4359-BFE0-FE2836652BE1}" dt="2025-03-23T23:51:13.317" v="12"/>
           <pc:sldLayoutMkLst>
             <pc:docMk/>
             <pc:sldMasterMk cId="3257810563" sldId="2147483670"/>
@@ -4948,12 +4948,9 @@
 <p:sldLayout xmlns:a="http://schemas.openxmlformats.org/drawingml/2006/main" xmlns:r="http://schemas.openxmlformats.org/officeDocument/2006/relationships" xmlns:p="http://schemas.openxmlformats.org/presentationml/2006/main" matchingName="Title Slide">
   <p:cSld name="1_Title Slide">
     <p:bg>
-      <p:bgPr>
-        <a:solidFill>
-          <a:schemeClr val="bg1"/>
-        </a:solidFill>
-        <a:effectLst/>
-      </p:bgPr>
+      <p:bgRef idx="1001">
+        <a:schemeClr val="bg1"/>
+      </p:bgRef>
     </p:bg>
     <p:spTree>
       <p:nvGrpSpPr>
@@ -5586,7 +5583,7 @@
     </p:extLst>
   </p:cSld>
   <p:clrMapOvr>
-    <a:masterClrMapping/>
+    <a:overrideClrMapping bg1="lt1" tx1="dk1" bg2="lt2" tx2="dk2" accent1="accent1" accent2="accent2" accent3="accent3" accent4="accent4" accent5="accent5" accent6="accent6" hlink="hlink" folHlink="folHlink"/>
   </p:clrMapOvr>
 </p:sldLayout>
 </file>
@@ -5595,12 +5592,9 @@
 <p:sldLayout xmlns:a="http://schemas.openxmlformats.org/drawingml/2006/main" xmlns:r="http://schemas.openxmlformats.org/officeDocument/2006/relationships" xmlns:p="http://schemas.openxmlformats.org/presentationml/2006/main" matchingName="7_Picture with Caption">
   <p:cSld name="7_Picture with Caption">
     <p:bg>
-      <p:bgPr>
-        <a:solidFill>
-          <a:schemeClr val="bg1"/>
-        </a:solidFill>
-        <a:effectLst/>
-      </p:bgPr>
+      <p:bgRef idx="1001">
+        <a:schemeClr val="bg1"/>
+      </p:bgRef>
     </p:bg>
     <p:spTree>
       <p:nvGrpSpPr>
@@ -6206,7 +6200,7 @@
           <p:nvPr userDrawn="1"/>
         </p:nvPicPr>
         <p:blipFill>
-          <a:blip r:embed="rId2" cstate="print">
+          <a:blip r:embed="rId2" cstate="screen">
             <a:alphaModFix/>
             <a:extLst>
               <a:ext uri="{28A0092B-C50C-407E-A947-70E740481C1C}">
@@ -6239,7 +6233,7 @@
     </p:extLst>
   </p:cSld>
   <p:clrMapOvr>
-    <a:masterClrMapping/>
+    <a:overrideClrMapping bg1="lt1" tx1="dk1" bg2="lt2" tx2="dk2" accent1="accent1" accent2="accent2" accent3="accent3" accent4="accent4" accent5="accent5" accent6="accent6" hlink="hlink" folHlink="folHlink"/>
   </p:clrMapOvr>
 </p:sldLayout>
 </file>
@@ -6894,30 +6888,6 @@
             </a:r>
             <a:endParaRPr sz="3600" dirty="0"/>
           </a:p>
-          <a:p>
-            <a:pPr marL="0" lvl="0" indent="0" algn="ctr" rtl="0">
-              <a:lnSpc>
-                <a:spcPct val="100000"/>
-              </a:lnSpc>
-              <a:spcBef>
-                <a:spcPts val="0"/>
-              </a:spcBef>
-              <a:spcAft>
-                <a:spcPts val="0"/>
-              </a:spcAft>
-              <a:buClr>
-                <a:srgbClr val="000000"/>
-              </a:buClr>
-              <a:buSzPts val="3600"/>
-              <a:buFont typeface="Roboto"/>
-              <a:buNone/>
-            </a:pPr>
-            <a:r>
-              <a:rPr lang="en" sz="2500" dirty="0"/>
-              <a:t>Qualifier Tournament 2025</a:t>
-            </a:r>
-            <a:endParaRPr sz="2500" dirty="0"/>
-          </a:p>
         </p:txBody>
       </p:sp>
       <p:pic>
@@ -6927,7 +6897,7 @@
           <p:nvPr/>
         </p:nvPicPr>
         <p:blipFill>
-          <a:blip r:embed="rId3" cstate="print">
+          <a:blip r:embed="rId3" cstate="screen">
             <a:alphaModFix/>
             <a:extLst>
               <a:ext uri="{28A0092B-C50C-407E-A947-70E740481C1C}">
@@ -9387,7 +9357,7 @@
           <p:nvPr/>
         </p:nvPicPr>
         <p:blipFill>
-          <a:blip r:embed="rId3" cstate="print">
+          <a:blip r:embed="rId3" cstate="screen">
             <a:alphaModFix/>
             <a:extLst>
               <a:ext uri="{28A0092B-C50C-407E-A947-70E740481C1C}">
@@ -9625,8 +9595,13 @@
           <p:nvPr/>
         </p:nvPicPr>
         <p:blipFill>
-          <a:blip r:embed="rId3">
+          <a:blip r:embed="rId3" cstate="screen">
             <a:alphaModFix/>
+            <a:extLst>
+              <a:ext uri="{28A0092B-C50C-407E-A947-70E740481C1C}">
+                <a14:useLocalDpi xmlns:a14="http://schemas.microsoft.com/office/drawing/2010/main"/>
+              </a:ext>
+            </a:extLst>
           </a:blip>
           <a:stretch>
             <a:fillRect/>
@@ -10348,8 +10323,13 @@
           <p:nvPr/>
         </p:nvPicPr>
         <p:blipFill>
-          <a:blip r:embed="rId3">
+          <a:blip r:embed="rId3" cstate="screen">
             <a:alphaModFix/>
+            <a:extLst>
+              <a:ext uri="{28A0092B-C50C-407E-A947-70E740481C1C}">
+                <a14:useLocalDpi xmlns:a14="http://schemas.microsoft.com/office/drawing/2010/main"/>
+              </a:ext>
+            </a:extLst>
           </a:blip>
           <a:stretch>
             <a:fillRect/>
@@ -10623,8 +10603,13 @@
           <p:nvPr/>
         </p:nvPicPr>
         <p:blipFill rotWithShape="1">
-          <a:blip r:embed="rId3">
+          <a:blip r:embed="rId3" cstate="screen">
             <a:alphaModFix/>
+            <a:extLst>
+              <a:ext uri="{28A0092B-C50C-407E-A947-70E740481C1C}">
+                <a14:useLocalDpi xmlns:a14="http://schemas.microsoft.com/office/drawing/2010/main"/>
+              </a:ext>
+            </a:extLst>
           </a:blip>
           <a:srcRect/>
           <a:stretch/>
@@ -11467,14 +11452,14 @@
           <p:nvPr/>
         </p:nvPicPr>
         <p:blipFill>
-          <a:blip r:embed="rId2" cstate="print">
+          <a:blip r:embed="rId2" cstate="screen">
             <a:extLst>
               <a:ext uri="{28A0092B-C50C-407E-A947-70E740481C1C}">
                 <a14:useLocalDpi xmlns:a14="http://schemas.microsoft.com/office/drawing/2010/main"/>
               </a:ext>
             </a:extLst>
           </a:blip>
-          <a:srcRect t="7739" b="16247"/>
+          <a:srcRect/>
           <a:stretch/>
         </p:blipFill>
         <p:spPr>

</xml_diff>